<commit_message>
re #712: Cropped image of fCal-1 phantom to only show the rubber band
The visible old wire pattern confused some users.

git-svn-id: https://subversion.assembla.com/svn/plus/trunk/doc@4098 c04e96f8-ac36-4ff2-8b34-4a5e34ef045f
</commit_message>
<xml_diff>
--- a/tutorials/PlusTutorialBuildingfCalPrintedPhantom.pptx
+++ b/tutorials/PlusTutorialBuildingfCalPrintedPhantom.pptx
@@ -115,6 +115,36 @@
       </a:defRPr>
     </a:lvl9pPr>
   </p:defaultTextStyle>
+  <p:extLst>
+    <p:ext uri="{EFAFB233-063F-42B5-8137-9DF3F51BA10A}">
+      <p15:sldGuideLst xmlns:p15="http://schemas.microsoft.com/office/powerpoint/2012/main">
+        <p15:guide id="1" orient="horz" pos="2160">
+          <p15:clr>
+            <a:srgbClr val="A4A3A4"/>
+          </p15:clr>
+        </p15:guide>
+        <p15:guide id="2" pos="2880">
+          <p15:clr>
+            <a:srgbClr val="A4A3A4"/>
+          </p15:clr>
+        </p15:guide>
+      </p15:sldGuideLst>
+    </p:ext>
+    <p:ext uri="{2D200454-40CA-4A62-9FC3-DE9A4176ACB9}">
+      <p15:notesGuideLst xmlns:p15="http://schemas.microsoft.com/office/powerpoint/2012/main">
+        <p15:guide id="1" orient="horz" pos="2880">
+          <p15:clr>
+            <a:srgbClr val="A4A3A4"/>
+          </p15:clr>
+        </p15:guide>
+        <p15:guide id="2" pos="2160">
+          <p15:clr>
+            <a:srgbClr val="A4A3A4"/>
+          </p15:clr>
+        </p15:guide>
+      </p15:notesGuideLst>
+    </p:ext>
+  </p:extLst>
 </p:presentation>
 </file>
 
@@ -201,7 +231,7 @@
             <a:fld id="{08AE2C8F-80C9-49EC-8D3E-1E16295FA588}" type="datetimeFigureOut">
               <a:rPr lang="en-US" smtClean="0"/>
               <a:pPr/>
-              <a:t>1/16/2014</a:t>
+              <a:t>2015-04-12</a:t>
             </a:fld>
             <a:endParaRPr lang="en-US"/>
           </a:p>
@@ -4291,11 +4321,7 @@
           <a:p>
             <a:r>
               <a:rPr lang="en-CA" dirty="0" smtClean="0"/>
-              <a:t>You can have a look at the </a:t>
-            </a:r>
-            <a:r>
-              <a:rPr lang="en-CA" dirty="0" smtClean="0"/>
-              <a:t>model file in </a:t>
+              <a:t>You can have a look at the model file in </a:t>
             </a:r>
             <a:r>
               <a:rPr lang="en-CA" dirty="0" smtClean="0">
@@ -5840,13 +5866,13 @@
         </p:nvSpPr>
         <p:spPr>
           <a:xfrm>
-            <a:off x="533400" y="990601"/>
-            <a:ext cx="8153400" cy="2438400"/>
+            <a:off x="533400" y="990600"/>
+            <a:ext cx="8153400" cy="4495799"/>
           </a:xfrm>
         </p:spPr>
         <p:txBody>
           <a:bodyPr>
-            <a:normAutofit fontScale="92500" lnSpcReduction="10000"/>
+            <a:normAutofit/>
           </a:bodyPr>
           <a:lstStyle/>
           <a:p>
@@ -5858,8 +5884,21 @@
           <a:p>
             <a:r>
               <a:rPr lang="en-US" dirty="0" smtClean="0"/>
-              <a:t>You can stretch the fiducial lines by using a rubber band as it is shown in the picture below</a:t>
-            </a:r>
+              <a:t>You can stretch the fiducial lines by using a rubber band as it is shown in the picture </a:t>
+            </a:r>
+            <a:r>
+              <a:rPr lang="en-US" dirty="0" smtClean="0"/>
+              <a:t>below</a:t>
+            </a:r>
+          </a:p>
+          <a:p>
+            <a:endParaRPr lang="en-US" dirty="0"/>
+          </a:p>
+          <a:p>
+            <a:endParaRPr lang="en-US" dirty="0" smtClean="0"/>
+          </a:p>
+          <a:p>
+            <a:endParaRPr lang="en-US" dirty="0" smtClean="0"/>
           </a:p>
           <a:p>
             <a:r>
@@ -5910,131 +5949,144 @@
           </a:p>
         </p:txBody>
       </p:sp>
-      <p:pic>
-        <p:nvPicPr>
-          <p:cNvPr id="4098" name="Picture 2" descr="H:\DCIM\100OLYMP\PA250552.JPG"/>
-          <p:cNvPicPr>
-            <a:picLocks noChangeAspect="1" noChangeArrowheads="1"/>
-          </p:cNvPicPr>
+      <p:grpSp>
+        <p:nvGrpSpPr>
+          <p:cNvPr id="4" name="Group 3"/>
+          <p:cNvGrpSpPr/>
           <p:nvPr/>
-        </p:nvPicPr>
-        <p:blipFill>
-          <a:blip r:embed="rId2" cstate="print"/>
-          <a:srcRect l="6438" t="28465" r="3436" b="18599"/>
-          <a:stretch>
-            <a:fillRect/>
-          </a:stretch>
-        </p:blipFill>
-        <p:spPr bwMode="auto">
+        </p:nvGrpSpPr>
+        <p:grpSpPr>
           <a:xfrm>
-            <a:off x="1371600" y="3429000"/>
-            <a:ext cx="6400800" cy="2819400"/>
+            <a:off x="1524000" y="3455822"/>
+            <a:ext cx="6400800" cy="1066800"/>
+            <a:chOff x="1371600" y="5181600"/>
+            <a:chExt cx="6400800" cy="1066800"/>
           </a:xfrm>
-          <a:prstGeom prst="rect">
-            <a:avLst/>
-          </a:prstGeom>
-          <a:noFill/>
-        </p:spPr>
-      </p:pic>
-      <p:cxnSp>
-        <p:nvCxnSpPr>
-          <p:cNvPr id="26" name="Straight Arrow Connector 25"/>
-          <p:cNvCxnSpPr/>
-          <p:nvPr/>
-        </p:nvCxnSpPr>
-        <p:spPr>
-          <a:xfrm flipH="1" flipV="1">
-            <a:off x="3886200" y="5410200"/>
-            <a:ext cx="1447800" cy="228600"/>
-          </a:xfrm>
-          <a:prstGeom prst="straightConnector1">
-            <a:avLst/>
-          </a:prstGeom>
-          <a:ln w="38100">
-            <a:solidFill>
-              <a:srgbClr val="FF0000"/>
-            </a:solidFill>
-            <a:tailEnd type="arrow"/>
-          </a:ln>
-        </p:spPr>
-        <p:style>
-          <a:lnRef idx="1">
-            <a:schemeClr val="accent1"/>
-          </a:lnRef>
-          <a:fillRef idx="0">
-            <a:schemeClr val="accent1"/>
-          </a:fillRef>
-          <a:effectRef idx="0">
-            <a:schemeClr val="accent1"/>
-          </a:effectRef>
-          <a:fontRef idx="minor">
-            <a:schemeClr val="tx1"/>
-          </a:fontRef>
-        </p:style>
-      </p:cxnSp>
-      <p:sp>
-        <p:nvSpPr>
-          <p:cNvPr id="27" name="Content Placeholder 2"/>
-          <p:cNvSpPr txBox="1">
-            <a:spLocks/>
-          </p:cNvSpPr>
-          <p:nvPr/>
-        </p:nvSpPr>
-        <p:spPr>
-          <a:xfrm>
-            <a:off x="3581400" y="5082540"/>
-            <a:ext cx="1074420" cy="480060"/>
-          </a:xfrm>
-          <a:prstGeom prst="rect">
-            <a:avLst/>
-          </a:prstGeom>
-        </p:spPr>
-        <p:txBody>
-          <a:bodyPr vert="horz" lIns="91440" tIns="45720" rIns="91440" bIns="45720" rtlCol="0">
-            <a:normAutofit/>
-          </a:bodyPr>
-          <a:lstStyle/>
-          <a:p>
-            <a:pPr marL="342900" marR="0" lvl="0" indent="-342900" algn="ctr" defTabSz="914400" rtl="0" eaLnBrk="1" fontAlgn="auto" latinLnBrk="0" hangingPunct="1">
-              <a:lnSpc>
-                <a:spcPct val="100000"/>
-              </a:lnSpc>
-              <a:spcBef>
-                <a:spcPct val="20000"/>
-              </a:spcBef>
-              <a:spcAft>
-                <a:spcPts val="0"/>
-              </a:spcAft>
-              <a:buClrTx/>
-              <a:buSzTx/>
-              <a:tabLst/>
-              <a:defRPr/>
-            </a:pPr>
-            <a:r>
-              <a:rPr lang="en-US" sz="1600" dirty="0" smtClean="0">
+        </p:grpSpPr>
+        <p:pic>
+          <p:nvPicPr>
+            <p:cNvPr id="4098" name="Picture 2" descr="H:\DCIM\100OLYMP\PA250552.JPG"/>
+            <p:cNvPicPr>
+              <a:picLocks noChangeAspect="1" noChangeArrowheads="1"/>
+            </p:cNvPicPr>
+            <p:nvPr/>
+          </p:nvPicPr>
+          <p:blipFill rotWithShape="1">
+            <a:blip r:embed="rId2" cstate="print"/>
+            <a:srcRect l="6438" t="61371" r="3437" b="18599"/>
+            <a:stretch/>
+          </p:blipFill>
+          <p:spPr bwMode="auto">
+            <a:xfrm>
+              <a:off x="1371600" y="5181600"/>
+              <a:ext cx="6400800" cy="1066800"/>
+            </a:xfrm>
+            <a:prstGeom prst="rect">
+              <a:avLst/>
+            </a:prstGeom>
+            <a:noFill/>
+          </p:spPr>
+        </p:pic>
+        <p:cxnSp>
+          <p:nvCxnSpPr>
+            <p:cNvPr id="26" name="Straight Arrow Connector 25"/>
+            <p:cNvCxnSpPr/>
+            <p:nvPr/>
+          </p:nvCxnSpPr>
+          <p:spPr>
+            <a:xfrm flipH="1" flipV="1">
+              <a:off x="3886200" y="5410200"/>
+              <a:ext cx="1447800" cy="228600"/>
+            </a:xfrm>
+            <a:prstGeom prst="straightConnector1">
+              <a:avLst/>
+            </a:prstGeom>
+            <a:ln w="38100">
+              <a:solidFill>
+                <a:srgbClr val="FF0000"/>
+              </a:solidFill>
+              <a:tailEnd type="arrow"/>
+            </a:ln>
+          </p:spPr>
+          <p:style>
+            <a:lnRef idx="1">
+              <a:schemeClr val="accent1"/>
+            </a:lnRef>
+            <a:fillRef idx="0">
+              <a:schemeClr val="accent1"/>
+            </a:fillRef>
+            <a:effectRef idx="0">
+              <a:schemeClr val="accent1"/>
+            </a:effectRef>
+            <a:fontRef idx="minor">
+              <a:schemeClr val="tx1"/>
+            </a:fontRef>
+          </p:style>
+        </p:cxnSp>
+        <p:sp>
+          <p:nvSpPr>
+            <p:cNvPr id="27" name="Content Placeholder 2"/>
+            <p:cNvSpPr txBox="1">
+              <a:spLocks/>
+            </p:cNvSpPr>
+            <p:nvPr/>
+          </p:nvSpPr>
+          <p:spPr>
+            <a:xfrm>
+              <a:off x="4419600" y="5181600"/>
+              <a:ext cx="1074420" cy="480060"/>
+            </a:xfrm>
+            <a:prstGeom prst="rect">
+              <a:avLst/>
+            </a:prstGeom>
+          </p:spPr>
+          <p:txBody>
+            <a:bodyPr vert="horz" lIns="91440" tIns="45720" rIns="91440" bIns="45720" rtlCol="0">
+              <a:normAutofit/>
+            </a:bodyPr>
+            <a:lstStyle/>
+            <a:p>
+              <a:pPr marL="342900" marR="0" lvl="0" indent="-342900" algn="ctr" defTabSz="914400" rtl="0" eaLnBrk="1" fontAlgn="auto" latinLnBrk="0" hangingPunct="1">
+                <a:lnSpc>
+                  <a:spcPct val="100000"/>
+                </a:lnSpc>
+                <a:spcBef>
+                  <a:spcPct val="20000"/>
+                </a:spcBef>
+                <a:spcAft>
+                  <a:spcPts val="0"/>
+                </a:spcAft>
+                <a:buClrTx/>
+                <a:buSzTx/>
+                <a:tabLst/>
+                <a:defRPr/>
+              </a:pPr>
+              <a:r>
+                <a:rPr lang="en-US" sz="1600" dirty="0" smtClean="0">
+                  <a:solidFill>
+                    <a:srgbClr val="FF0000"/>
+                  </a:solidFill>
+                </a:rPr>
+                <a:t>Stretching</a:t>
+              </a:r>
+              <a:endParaRPr kumimoji="0" lang="en-US" sz="1600" b="0" i="0" u="none" strike="noStrike" kern="1200" cap="none" spc="0" normalizeH="0" baseline="0" noProof="0" dirty="0" smtClean="0">
+                <a:ln>
+                  <a:noFill/>
+                </a:ln>
                 <a:solidFill>
                   <a:srgbClr val="FF0000"/>
                 </a:solidFill>
-              </a:rPr>
-              <a:t>Stretching</a:t>
-            </a:r>
-            <a:endParaRPr kumimoji="0" lang="en-US" sz="1600" b="0" i="0" u="none" strike="noStrike" kern="1200" cap="none" spc="0" normalizeH="0" baseline="0" noProof="0" dirty="0" smtClean="0">
-              <a:ln>
-                <a:noFill/>
-              </a:ln>
-              <a:solidFill>
-                <a:srgbClr val="FF0000"/>
-              </a:solidFill>
-              <a:effectLst/>
-              <a:uLnTx/>
-              <a:uFillTx/>
-              <a:latin typeface="+mn-lt"/>
-              <a:ea typeface="+mn-ea"/>
-              <a:cs typeface="+mn-cs"/>
-            </a:endParaRPr>
-          </a:p>
-        </p:txBody>
-      </p:sp>
+                <a:effectLst/>
+                <a:uLnTx/>
+                <a:uFillTx/>
+                <a:latin typeface="+mn-lt"/>
+                <a:ea typeface="+mn-ea"/>
+                <a:cs typeface="+mn-cs"/>
+              </a:endParaRPr>
+            </a:p>
+          </p:txBody>
+        </p:sp>
+      </p:grpSp>
     </p:spTree>
     <p:extLst>
       <p:ext uri="{BB962C8B-B14F-4D97-AF65-F5344CB8AC3E}">

</xml_diff>

<commit_message>
Updating links to remove Assembla references
</commit_message>
<xml_diff>
--- a/tutorials/PlusTutorialBuildingfCalPrintedPhantom.pptx
+++ b/tutorials/PlusTutorialBuildingfCalPrintedPhantom.pptx
@@ -231,7 +231,7 @@
             <a:fld id="{08AE2C8F-80C9-49EC-8D3E-1E16295FA588}" type="datetimeFigureOut">
               <a:rPr lang="en-US" smtClean="0"/>
               <a:pPr/>
-              <a:t>2015-04-12</a:t>
+              <a:t>10/12/2022</a:t>
             </a:fld>
             <a:endParaRPr lang="en-US"/>
           </a:p>
@@ -295,38 +295,37 @@
           <a:p>
             <a:pPr lvl="0"/>
             <a:r>
-              <a:rPr lang="en-US" smtClean="0"/>
+              <a:rPr lang="en-US"/>
               <a:t>Click to edit Master text styles</a:t>
             </a:r>
           </a:p>
           <a:p>
             <a:pPr lvl="1"/>
             <a:r>
-              <a:rPr lang="en-US" smtClean="0"/>
+              <a:rPr lang="en-US"/>
               <a:t>Second level</a:t>
             </a:r>
           </a:p>
           <a:p>
             <a:pPr lvl="2"/>
             <a:r>
-              <a:rPr lang="en-US" smtClean="0"/>
+              <a:rPr lang="en-US"/>
               <a:t>Third level</a:t>
             </a:r>
           </a:p>
           <a:p>
             <a:pPr lvl="3"/>
             <a:r>
-              <a:rPr lang="en-US" smtClean="0"/>
+              <a:rPr lang="en-US"/>
               <a:t>Fourth level</a:t>
             </a:r>
           </a:p>
           <a:p>
             <a:pPr lvl="4"/>
             <a:r>
-              <a:rPr lang="en-US" smtClean="0"/>
+              <a:rPr lang="en-US"/>
               <a:t>Fifth level</a:t>
             </a:r>
-            <a:endParaRPr lang="en-US"/>
           </a:p>
         </p:txBody>
       </p:sp>
@@ -538,10 +537,9 @@
           <a:lstStyle/>
           <a:p>
             <a:r>
-              <a:rPr lang="en-US" smtClean="0"/>
+              <a:rPr lang="en-US"/>
               <a:t>Click to edit Master title style</a:t>
             </a:r>
-            <a:endParaRPr lang="en-US"/>
           </a:p>
         </p:txBody>
       </p:sp>
@@ -657,10 +655,9 @@
           </a:lstStyle>
           <a:p>
             <a:r>
-              <a:rPr lang="en-US" smtClean="0"/>
+              <a:rPr lang="en-US"/>
               <a:t>Click to edit Master subtitle style</a:t>
             </a:r>
-            <a:endParaRPr lang="en-US"/>
           </a:p>
         </p:txBody>
       </p:sp>
@@ -699,10 +696,9 @@
           <a:lstStyle/>
           <a:p>
             <a:r>
-              <a:rPr lang="en-US" smtClean="0"/>
+              <a:rPr lang="en-US"/>
               <a:t>Laboratory for Percutaneous Surgery (The Perk Lab) – Copyright © Queen’s University, 2011 </a:t>
             </a:r>
-            <a:endParaRPr lang="en-US"/>
           </a:p>
         </p:txBody>
       </p:sp>
@@ -776,10 +772,9 @@
           <a:lstStyle/>
           <a:p>
             <a:r>
-              <a:rPr lang="en-US" smtClean="0"/>
+              <a:rPr lang="en-US"/>
               <a:t>Click to edit Master title style</a:t>
             </a:r>
-            <a:endParaRPr lang="en-US"/>
           </a:p>
         </p:txBody>
       </p:sp>
@@ -800,38 +795,37 @@
           <a:p>
             <a:pPr lvl="0"/>
             <a:r>
-              <a:rPr lang="en-US" smtClean="0"/>
+              <a:rPr lang="en-US"/>
               <a:t>Click to edit Master text styles</a:t>
             </a:r>
           </a:p>
           <a:p>
             <a:pPr lvl="1"/>
             <a:r>
-              <a:rPr lang="en-US" smtClean="0"/>
+              <a:rPr lang="en-US"/>
               <a:t>Second level</a:t>
             </a:r>
           </a:p>
           <a:p>
             <a:pPr lvl="2"/>
             <a:r>
-              <a:rPr lang="en-US" smtClean="0"/>
+              <a:rPr lang="en-US"/>
               <a:t>Third level</a:t>
             </a:r>
           </a:p>
           <a:p>
             <a:pPr lvl="3"/>
             <a:r>
-              <a:rPr lang="en-US" smtClean="0"/>
+              <a:rPr lang="en-US"/>
               <a:t>Fourth level</a:t>
             </a:r>
           </a:p>
           <a:p>
             <a:pPr lvl="4"/>
             <a:r>
-              <a:rPr lang="en-US" smtClean="0"/>
+              <a:rPr lang="en-US"/>
               <a:t>Fifth level</a:t>
             </a:r>
-            <a:endParaRPr lang="en-US"/>
           </a:p>
         </p:txBody>
       </p:sp>
@@ -870,10 +864,9 @@
           <a:lstStyle/>
           <a:p>
             <a:r>
-              <a:rPr lang="en-US" smtClean="0"/>
+              <a:rPr lang="en-US"/>
               <a:t>Laboratory for Percutaneous Surgery (The Perk Lab) – Copyright © Queen’s University, 2011 </a:t>
             </a:r>
-            <a:endParaRPr lang="en-US"/>
           </a:p>
         </p:txBody>
       </p:sp>
@@ -952,10 +945,9 @@
           <a:lstStyle/>
           <a:p>
             <a:r>
-              <a:rPr lang="en-US" smtClean="0"/>
+              <a:rPr lang="en-US"/>
               <a:t>Click to edit Master title style</a:t>
             </a:r>
-            <a:endParaRPr lang="en-US"/>
           </a:p>
         </p:txBody>
       </p:sp>
@@ -981,38 +973,37 @@
           <a:p>
             <a:pPr lvl="0"/>
             <a:r>
-              <a:rPr lang="en-US" smtClean="0"/>
+              <a:rPr lang="en-US"/>
               <a:t>Click to edit Master text styles</a:t>
             </a:r>
           </a:p>
           <a:p>
             <a:pPr lvl="1"/>
             <a:r>
-              <a:rPr lang="en-US" smtClean="0"/>
+              <a:rPr lang="en-US"/>
               <a:t>Second level</a:t>
             </a:r>
           </a:p>
           <a:p>
             <a:pPr lvl="2"/>
             <a:r>
-              <a:rPr lang="en-US" smtClean="0"/>
+              <a:rPr lang="en-US"/>
               <a:t>Third level</a:t>
             </a:r>
           </a:p>
           <a:p>
             <a:pPr lvl="3"/>
             <a:r>
-              <a:rPr lang="en-US" smtClean="0"/>
+              <a:rPr lang="en-US"/>
               <a:t>Fourth level</a:t>
             </a:r>
           </a:p>
           <a:p>
             <a:pPr lvl="4"/>
             <a:r>
-              <a:rPr lang="en-US" smtClean="0"/>
+              <a:rPr lang="en-US"/>
               <a:t>Fifth level</a:t>
             </a:r>
-            <a:endParaRPr lang="en-US"/>
           </a:p>
         </p:txBody>
       </p:sp>
@@ -1051,10 +1042,9 @@
           <a:lstStyle/>
           <a:p>
             <a:r>
-              <a:rPr lang="en-US" smtClean="0"/>
+              <a:rPr lang="en-US"/>
               <a:t>Laboratory for Percutaneous Surgery (The Perk Lab) – Copyright © Queen’s University, 2011 </a:t>
             </a:r>
-            <a:endParaRPr lang="en-US"/>
           </a:p>
         </p:txBody>
       </p:sp>
@@ -1133,10 +1123,9 @@
           <a:lstStyle/>
           <a:p>
             <a:r>
-              <a:rPr lang="en-US" smtClean="0"/>
+              <a:rPr lang="en-US"/>
               <a:t>Click to edit Master title style</a:t>
             </a:r>
-            <a:endParaRPr lang="en-US"/>
           </a:p>
         </p:txBody>
       </p:sp>
@@ -1175,38 +1164,37 @@
           <a:p>
             <a:pPr lvl="0"/>
             <a:r>
-              <a:rPr lang="en-US" smtClean="0"/>
+              <a:rPr lang="en-US"/>
               <a:t>Click to edit Master text styles</a:t>
             </a:r>
           </a:p>
           <a:p>
             <a:pPr lvl="1"/>
             <a:r>
-              <a:rPr lang="en-US" smtClean="0"/>
+              <a:rPr lang="en-US"/>
               <a:t>Second level</a:t>
             </a:r>
           </a:p>
           <a:p>
             <a:pPr lvl="2"/>
             <a:r>
-              <a:rPr lang="en-US" smtClean="0"/>
+              <a:rPr lang="en-US"/>
               <a:t>Third level</a:t>
             </a:r>
           </a:p>
           <a:p>
             <a:pPr lvl="3"/>
             <a:r>
-              <a:rPr lang="en-US" smtClean="0"/>
+              <a:rPr lang="en-US"/>
               <a:t>Fourth level</a:t>
             </a:r>
           </a:p>
           <a:p>
             <a:pPr lvl="4"/>
             <a:r>
-              <a:rPr lang="en-US" smtClean="0"/>
+              <a:rPr lang="en-US"/>
               <a:t>Fifth level</a:t>
             </a:r>
-            <a:endParaRPr lang="en-US"/>
           </a:p>
         </p:txBody>
       </p:sp>
@@ -1231,7 +1219,7 @@
           <a:lstStyle/>
           <a:p>
             <a:r>
-              <a:rPr lang="en-US" dirty="0" smtClean="0"/>
+              <a:rPr lang="en-US" dirty="0"/>
               <a:t>Laboratory for Percutaneous Surgery (The Perk Lab) – Copyright © Queen’s University, 2011</a:t>
             </a:r>
           </a:p>
@@ -1295,10 +1283,9 @@
           </a:lstStyle>
           <a:p>
             <a:r>
-              <a:rPr lang="en-US" smtClean="0"/>
+              <a:rPr lang="en-US"/>
               <a:t>Click to edit Master title style</a:t>
             </a:r>
-            <a:endParaRPr lang="en-US"/>
           </a:p>
         </p:txBody>
       </p:sp>
@@ -1415,7 +1402,7 @@
           <a:p>
             <a:pPr lvl="0"/>
             <a:r>
-              <a:rPr lang="en-US" smtClean="0"/>
+              <a:rPr lang="en-US"/>
               <a:t>Click to edit Master text styles</a:t>
             </a:r>
           </a:p>
@@ -1456,10 +1443,9 @@
           <a:lstStyle/>
           <a:p>
             <a:r>
-              <a:rPr lang="en-US" smtClean="0"/>
+              <a:rPr lang="en-US"/>
               <a:t>Laboratory for Percutaneous Surgery (The Perk Lab) – Copyright © Queen’s University, 2011 </a:t>
             </a:r>
-            <a:endParaRPr lang="en-US"/>
           </a:p>
         </p:txBody>
       </p:sp>
@@ -1533,10 +1519,9 @@
           <a:lstStyle/>
           <a:p>
             <a:r>
-              <a:rPr lang="en-US" smtClean="0"/>
+              <a:rPr lang="en-US"/>
               <a:t>Click to edit Master title style</a:t>
             </a:r>
-            <a:endParaRPr lang="en-US"/>
           </a:p>
         </p:txBody>
       </p:sp>
@@ -1590,38 +1575,37 @@
           <a:p>
             <a:pPr lvl="0"/>
             <a:r>
-              <a:rPr lang="en-US" smtClean="0"/>
+              <a:rPr lang="en-US"/>
               <a:t>Click to edit Master text styles</a:t>
             </a:r>
           </a:p>
           <a:p>
             <a:pPr lvl="1"/>
             <a:r>
-              <a:rPr lang="en-US" smtClean="0"/>
+              <a:rPr lang="en-US"/>
               <a:t>Second level</a:t>
             </a:r>
           </a:p>
           <a:p>
             <a:pPr lvl="2"/>
             <a:r>
-              <a:rPr lang="en-US" smtClean="0"/>
+              <a:rPr lang="en-US"/>
               <a:t>Third level</a:t>
             </a:r>
           </a:p>
           <a:p>
             <a:pPr lvl="3"/>
             <a:r>
-              <a:rPr lang="en-US" smtClean="0"/>
+              <a:rPr lang="en-US"/>
               <a:t>Fourth level</a:t>
             </a:r>
           </a:p>
           <a:p>
             <a:pPr lvl="4"/>
             <a:r>
-              <a:rPr lang="en-US" smtClean="0"/>
+              <a:rPr lang="en-US"/>
               <a:t>Fifth level</a:t>
             </a:r>
-            <a:endParaRPr lang="en-US"/>
           </a:p>
         </p:txBody>
       </p:sp>
@@ -1675,38 +1659,37 @@
           <a:p>
             <a:pPr lvl="0"/>
             <a:r>
-              <a:rPr lang="en-US" smtClean="0"/>
+              <a:rPr lang="en-US"/>
               <a:t>Click to edit Master text styles</a:t>
             </a:r>
           </a:p>
           <a:p>
             <a:pPr lvl="1"/>
             <a:r>
-              <a:rPr lang="en-US" smtClean="0"/>
+              <a:rPr lang="en-US"/>
               <a:t>Second level</a:t>
             </a:r>
           </a:p>
           <a:p>
             <a:pPr lvl="2"/>
             <a:r>
-              <a:rPr lang="en-US" smtClean="0"/>
+              <a:rPr lang="en-US"/>
               <a:t>Third level</a:t>
             </a:r>
           </a:p>
           <a:p>
             <a:pPr lvl="3"/>
             <a:r>
-              <a:rPr lang="en-US" smtClean="0"/>
+              <a:rPr lang="en-US"/>
               <a:t>Fourth level</a:t>
             </a:r>
           </a:p>
           <a:p>
             <a:pPr lvl="4"/>
             <a:r>
-              <a:rPr lang="en-US" smtClean="0"/>
+              <a:rPr lang="en-US"/>
               <a:t>Fifth level</a:t>
             </a:r>
-            <a:endParaRPr lang="en-US"/>
           </a:p>
         </p:txBody>
       </p:sp>
@@ -1745,10 +1728,9 @@
           <a:lstStyle/>
           <a:p>
             <a:r>
-              <a:rPr lang="en-US" smtClean="0"/>
+              <a:rPr lang="en-US"/>
               <a:t>Laboratory for Percutaneous Surgery (The Perk Lab) – Copyright © Queen’s University, 2011 </a:t>
             </a:r>
-            <a:endParaRPr lang="en-US"/>
           </a:p>
         </p:txBody>
       </p:sp>
@@ -1826,10 +1808,9 @@
           </a:lstStyle>
           <a:p>
             <a:r>
-              <a:rPr lang="en-US" smtClean="0"/>
+              <a:rPr lang="en-US"/>
               <a:t>Click to edit Master title style</a:t>
             </a:r>
-            <a:endParaRPr lang="en-US"/>
           </a:p>
         </p:txBody>
       </p:sp>
@@ -1892,7 +1873,7 @@
           <a:p>
             <a:pPr lvl="0"/>
             <a:r>
-              <a:rPr lang="en-US" smtClean="0"/>
+              <a:rPr lang="en-US"/>
               <a:t>Click to edit Master text styles</a:t>
             </a:r>
           </a:p>
@@ -1948,38 +1929,37 @@
           <a:p>
             <a:pPr lvl="0"/>
             <a:r>
-              <a:rPr lang="en-US" smtClean="0"/>
+              <a:rPr lang="en-US"/>
               <a:t>Click to edit Master text styles</a:t>
             </a:r>
           </a:p>
           <a:p>
             <a:pPr lvl="1"/>
             <a:r>
-              <a:rPr lang="en-US" smtClean="0"/>
+              <a:rPr lang="en-US"/>
               <a:t>Second level</a:t>
             </a:r>
           </a:p>
           <a:p>
             <a:pPr lvl="2"/>
             <a:r>
-              <a:rPr lang="en-US" smtClean="0"/>
+              <a:rPr lang="en-US"/>
               <a:t>Third level</a:t>
             </a:r>
           </a:p>
           <a:p>
             <a:pPr lvl="3"/>
             <a:r>
-              <a:rPr lang="en-US" smtClean="0"/>
+              <a:rPr lang="en-US"/>
               <a:t>Fourth level</a:t>
             </a:r>
           </a:p>
           <a:p>
             <a:pPr lvl="4"/>
             <a:r>
-              <a:rPr lang="en-US" smtClean="0"/>
+              <a:rPr lang="en-US"/>
               <a:t>Fifth level</a:t>
             </a:r>
-            <a:endParaRPr lang="en-US"/>
           </a:p>
         </p:txBody>
       </p:sp>
@@ -2042,7 +2022,7 @@
           <a:p>
             <a:pPr lvl="0"/>
             <a:r>
-              <a:rPr lang="en-US" smtClean="0"/>
+              <a:rPr lang="en-US"/>
               <a:t>Click to edit Master text styles</a:t>
             </a:r>
           </a:p>
@@ -2098,38 +2078,37 @@
           <a:p>
             <a:pPr lvl="0"/>
             <a:r>
-              <a:rPr lang="en-US" smtClean="0"/>
+              <a:rPr lang="en-US"/>
               <a:t>Click to edit Master text styles</a:t>
             </a:r>
           </a:p>
           <a:p>
             <a:pPr lvl="1"/>
             <a:r>
-              <a:rPr lang="en-US" smtClean="0"/>
+              <a:rPr lang="en-US"/>
               <a:t>Second level</a:t>
             </a:r>
           </a:p>
           <a:p>
             <a:pPr lvl="2"/>
             <a:r>
-              <a:rPr lang="en-US" smtClean="0"/>
+              <a:rPr lang="en-US"/>
               <a:t>Third level</a:t>
             </a:r>
           </a:p>
           <a:p>
             <a:pPr lvl="3"/>
             <a:r>
-              <a:rPr lang="en-US" smtClean="0"/>
+              <a:rPr lang="en-US"/>
               <a:t>Fourth level</a:t>
             </a:r>
           </a:p>
           <a:p>
             <a:pPr lvl="4"/>
             <a:r>
-              <a:rPr lang="en-US" smtClean="0"/>
+              <a:rPr lang="en-US"/>
               <a:t>Fifth level</a:t>
             </a:r>
-            <a:endParaRPr lang="en-US"/>
           </a:p>
         </p:txBody>
       </p:sp>
@@ -2168,10 +2147,9 @@
           <a:lstStyle/>
           <a:p>
             <a:r>
-              <a:rPr lang="en-US" smtClean="0"/>
+              <a:rPr lang="en-US"/>
               <a:t>Laboratory for Percutaneous Surgery (The Perk Lab) – Copyright © Queen’s University, 2011 </a:t>
             </a:r>
-            <a:endParaRPr lang="en-US"/>
           </a:p>
         </p:txBody>
       </p:sp>
@@ -2245,10 +2223,9 @@
           <a:lstStyle/>
           <a:p>
             <a:r>
-              <a:rPr lang="en-US" smtClean="0"/>
+              <a:rPr lang="en-US"/>
               <a:t>Click to edit Master title style</a:t>
             </a:r>
-            <a:endParaRPr lang="en-US"/>
           </a:p>
         </p:txBody>
       </p:sp>
@@ -2287,10 +2264,9 @@
           <a:lstStyle/>
           <a:p>
             <a:r>
-              <a:rPr lang="en-US" smtClean="0"/>
+              <a:rPr lang="en-US"/>
               <a:t>Laboratory for Percutaneous Surgery (The Perk Lab) – Copyright © Queen’s University, 2011 </a:t>
             </a:r>
-            <a:endParaRPr lang="en-US"/>
           </a:p>
         </p:txBody>
       </p:sp>
@@ -2383,10 +2359,9 @@
           <a:lstStyle/>
           <a:p>
             <a:r>
-              <a:rPr lang="en-US" smtClean="0"/>
+              <a:rPr lang="en-US"/>
               <a:t>Laboratory for Percutaneous Surgery (The Perk Lab) – Copyright © Queen’s University, 2011 </a:t>
             </a:r>
-            <a:endParaRPr lang="en-US"/>
           </a:p>
         </p:txBody>
       </p:sp>
@@ -2469,10 +2444,9 @@
           </a:lstStyle>
           <a:p>
             <a:r>
-              <a:rPr lang="en-US" smtClean="0"/>
+              <a:rPr lang="en-US"/>
               <a:t>Click to edit Master title style</a:t>
             </a:r>
-            <a:endParaRPr lang="en-US"/>
           </a:p>
         </p:txBody>
       </p:sp>
@@ -2526,38 +2500,37 @@
           <a:p>
             <a:pPr lvl="0"/>
             <a:r>
-              <a:rPr lang="en-US" smtClean="0"/>
+              <a:rPr lang="en-US"/>
               <a:t>Click to edit Master text styles</a:t>
             </a:r>
           </a:p>
           <a:p>
             <a:pPr lvl="1"/>
             <a:r>
-              <a:rPr lang="en-US" smtClean="0"/>
+              <a:rPr lang="en-US"/>
               <a:t>Second level</a:t>
             </a:r>
           </a:p>
           <a:p>
             <a:pPr lvl="2"/>
             <a:r>
-              <a:rPr lang="en-US" smtClean="0"/>
+              <a:rPr lang="en-US"/>
               <a:t>Third level</a:t>
             </a:r>
           </a:p>
           <a:p>
             <a:pPr lvl="3"/>
             <a:r>
-              <a:rPr lang="en-US" smtClean="0"/>
+              <a:rPr lang="en-US"/>
               <a:t>Fourth level</a:t>
             </a:r>
           </a:p>
           <a:p>
             <a:pPr lvl="4"/>
             <a:r>
-              <a:rPr lang="en-US" smtClean="0"/>
+              <a:rPr lang="en-US"/>
               <a:t>Fifth level</a:t>
             </a:r>
-            <a:endParaRPr lang="en-US"/>
           </a:p>
         </p:txBody>
       </p:sp>
@@ -2620,7 +2593,7 @@
           <a:p>
             <a:pPr lvl="0"/>
             <a:r>
-              <a:rPr lang="en-US" smtClean="0"/>
+              <a:rPr lang="en-US"/>
               <a:t>Click to edit Master text styles</a:t>
             </a:r>
           </a:p>
@@ -2661,10 +2634,9 @@
           <a:lstStyle/>
           <a:p>
             <a:r>
-              <a:rPr lang="en-US" smtClean="0"/>
+              <a:rPr lang="en-US"/>
               <a:t>Laboratory for Percutaneous Surgery (The Perk Lab) – Copyright © Queen’s University, 2011 </a:t>
             </a:r>
-            <a:endParaRPr lang="en-US"/>
           </a:p>
         </p:txBody>
       </p:sp>
@@ -2747,10 +2719,9 @@
           </a:lstStyle>
           <a:p>
             <a:r>
-              <a:rPr lang="en-US" smtClean="0"/>
+              <a:rPr lang="en-US"/>
               <a:t>Click to edit Master title style</a:t>
             </a:r>
-            <a:endParaRPr lang="en-US"/>
           </a:p>
         </p:txBody>
       </p:sp>
@@ -2874,7 +2845,7 @@
           <a:p>
             <a:pPr lvl="0"/>
             <a:r>
-              <a:rPr lang="en-US" smtClean="0"/>
+              <a:rPr lang="en-US"/>
               <a:t>Click to edit Master text styles</a:t>
             </a:r>
           </a:p>
@@ -2915,10 +2886,9 @@
           <a:lstStyle/>
           <a:p>
             <a:r>
-              <a:rPr lang="en-US" smtClean="0"/>
+              <a:rPr lang="en-US"/>
               <a:t>Laboratory for Percutaneous Surgery (The Perk Lab) – Copyright © Queen’s University, 2011 </a:t>
             </a:r>
-            <a:endParaRPr lang="en-US"/>
           </a:p>
         </p:txBody>
       </p:sp>
@@ -3007,10 +2977,9 @@
           <a:lstStyle/>
           <a:p>
             <a:r>
-              <a:rPr lang="en-US" smtClean="0"/>
+              <a:rPr lang="en-US"/>
               <a:t>Click to edit Master title style</a:t>
             </a:r>
-            <a:endParaRPr lang="en-US"/>
           </a:p>
         </p:txBody>
       </p:sp>
@@ -3041,38 +3010,37 @@
           <a:p>
             <a:pPr lvl="0"/>
             <a:r>
-              <a:rPr lang="en-US" smtClean="0"/>
+              <a:rPr lang="en-US"/>
               <a:t>Click to edit Master text styles</a:t>
             </a:r>
           </a:p>
           <a:p>
             <a:pPr lvl="1"/>
             <a:r>
-              <a:rPr lang="en-US" smtClean="0"/>
+              <a:rPr lang="en-US"/>
               <a:t>Second level</a:t>
             </a:r>
           </a:p>
           <a:p>
             <a:pPr lvl="2"/>
             <a:r>
-              <a:rPr lang="en-US" smtClean="0"/>
+              <a:rPr lang="en-US"/>
               <a:t>Third level</a:t>
             </a:r>
           </a:p>
           <a:p>
             <a:pPr lvl="3"/>
             <a:r>
-              <a:rPr lang="en-US" smtClean="0"/>
+              <a:rPr lang="en-US"/>
               <a:t>Fourth level</a:t>
             </a:r>
           </a:p>
           <a:p>
             <a:pPr lvl="4"/>
             <a:r>
-              <a:rPr lang="en-US" smtClean="0"/>
+              <a:rPr lang="en-US"/>
               <a:t>Fifth level</a:t>
             </a:r>
-            <a:endParaRPr lang="en-US"/>
           </a:p>
         </p:txBody>
       </p:sp>
@@ -3147,10 +3115,9 @@
           </a:lstStyle>
           <a:p>
             <a:r>
-              <a:rPr lang="en-US" smtClean="0"/>
+              <a:rPr lang="en-US"/>
               <a:t>Laboratory for Percutaneous Surgery (The Perk Lab) – Copyright © Queen’s University, 2011 </a:t>
             </a:r>
-            <a:endParaRPr lang="en-US"/>
           </a:p>
         </p:txBody>
       </p:sp>
@@ -3506,32 +3473,27 @@
           <a:lstStyle/>
           <a:p>
             <a:r>
-              <a:rPr lang="en-US" dirty="0" smtClean="0"/>
+              <a:rPr lang="en-US" dirty="0"/>
               <a:t>PLUS Tutorial:</a:t>
             </a:r>
             <a:br>
-              <a:rPr lang="en-US" dirty="0" smtClean="0"/>
+              <a:rPr lang="en-US" dirty="0"/>
             </a:br>
-            <a:r>
-              <a:rPr lang="en-US" dirty="0" smtClean="0"/>
-              <a:t/>
-            </a:r>
             <a:br>
-              <a:rPr lang="en-US" dirty="0" smtClean="0"/>
+              <a:rPr lang="en-US" dirty="0"/>
             </a:br>
             <a:r>
-              <a:rPr lang="en-US" dirty="0" smtClean="0"/>
+              <a:rPr lang="en-US" dirty="0"/>
               <a:t>How to build an </a:t>
             </a:r>
             <a:r>
-              <a:rPr lang="en-US" dirty="0" err="1" smtClean="0"/>
+              <a:rPr lang="en-US" dirty="0" err="1"/>
               <a:t>fCal</a:t>
             </a:r>
             <a:r>
-              <a:rPr lang="en-US" dirty="0" smtClean="0"/>
+              <a:rPr lang="en-US" dirty="0"/>
               <a:t> calibration phantom</a:t>
             </a:r>
-            <a:endParaRPr lang="en-US" dirty="0"/>
           </a:p>
         </p:txBody>
       </p:sp>
@@ -3561,40 +3523,34 @@
               <a:defRPr/>
             </a:pPr>
             <a:r>
-              <a:rPr lang="en-US" sz="1800" dirty="0" smtClean="0">
+              <a:rPr lang="en-US" sz="1800" dirty="0">
                 <a:hlinkClick r:id="rId2"/>
               </a:rPr>
-              <a:t>www.assembla.com/spaces/plus</a:t>
-            </a:r>
-            <a:endParaRPr lang="en-US" sz="1800" dirty="0" smtClean="0"/>
+              <a:t>https://github.com/PlusToolkit/</a:t>
+            </a:r>
+            <a:endParaRPr lang="en-US" sz="1800" dirty="0"/>
           </a:p>
           <a:p>
             <a:pPr>
               <a:defRPr/>
             </a:pPr>
             <a:r>
-              <a:rPr lang="en-US" sz="1200" dirty="0" smtClean="0"/>
+              <a:rPr lang="en-US" sz="1200" dirty="0"/>
               <a:t>Source: </a:t>
             </a:r>
             <a:r>
               <a:rPr lang="en-US" sz="1200" dirty="0">
                 <a:hlinkClick r:id="rId3"/>
               </a:rPr>
-              <a:t>https://</a:t>
-            </a:r>
-            <a:r>
-              <a:rPr lang="en-US" sz="1200" dirty="0" smtClean="0">
-                <a:hlinkClick r:id="rId3"/>
-              </a:rPr>
-              <a:t>subversion.assembla.com/svn/plus/trunk/doc/tutorials/PlusTutorialBuildingfCalPhantom.pptx</a:t>
-            </a:r>
-            <a:endParaRPr lang="en-US" sz="1200" dirty="0" smtClean="0"/>
+              <a:t>https://github.com/PlusToolkit/PlusDoc/blob/master/tutorials/PlusTutorialBuildingfCalPrintedPhantom.pptx</a:t>
+            </a:r>
+            <a:endParaRPr lang="en-US" sz="1200" dirty="0"/>
           </a:p>
           <a:p>
             <a:pPr>
               <a:defRPr/>
             </a:pPr>
-            <a:endParaRPr lang="en-US" sz="1800" dirty="0" smtClean="0"/>
+            <a:endParaRPr lang="en-US" sz="1800" dirty="0"/>
           </a:p>
         </p:txBody>
       </p:sp>
@@ -3608,13 +3564,6 @@
   <p:clrMapOvr>
     <a:masterClrMapping/>
   </p:clrMapOvr>
-  <p:timing>
-    <p:tnLst>
-      <p:par>
-        <p:cTn id="1" dur="indefinite" restart="never" nodeType="tmRoot"/>
-      </p:par>
-    </p:tnLst>
-  </p:timing>
 </p:sld>
 </file>
 
@@ -3653,10 +3602,9 @@
           <a:lstStyle/>
           <a:p>
             <a:r>
-              <a:rPr lang="en-CA" dirty="0" smtClean="0"/>
+              <a:rPr lang="en-CA" dirty="0"/>
               <a:t>Calibration phantom revisions</a:t>
             </a:r>
-            <a:endParaRPr lang="en-CA" dirty="0"/>
           </a:p>
         </p:txBody>
       </p:sp>
@@ -3683,69 +3631,45 @@
           <a:lstStyle/>
           <a:p>
             <a:r>
-              <a:rPr lang="en-CA" b="1" dirty="0" smtClean="0">
-                <a:hlinkClick r:id="rId2"/>
-              </a:rPr>
-              <a:t>Phantom </a:t>
-            </a:r>
-            <a:r>
               <a:rPr lang="en-CA" b="1" dirty="0">
                 <a:hlinkClick r:id="rId2"/>
               </a:rPr>
-              <a:t>model: </a:t>
-            </a:r>
-            <a:r>
-              <a:rPr lang="en-CA" b="1" dirty="0" smtClean="0">
-                <a:hlinkClick r:id="rId2"/>
-              </a:rPr>
-              <a:t>fCal_2.0</a:t>
-            </a:r>
-            <a:r>
-              <a:rPr lang="en-CA" b="1" dirty="0">
-                <a:hlinkClick r:id="rId2"/>
-              </a:rPr>
-              <a:t>, Wiring: </a:t>
-            </a:r>
-            <a:r>
-              <a:rPr lang="en-CA" b="1" dirty="0" smtClean="0">
-                <a:hlinkClick r:id="rId2"/>
-              </a:rPr>
-              <a:t>wiring_2.0</a:t>
-            </a:r>
-            <a:endParaRPr lang="en-CA" b="1" dirty="0" smtClean="0"/>
+              <a:t>Phantom model: fCal_2.0, Wiring: wiring_2.0</a:t>
+            </a:r>
+            <a:endParaRPr lang="en-CA" b="1" dirty="0"/>
           </a:p>
           <a:p>
             <a:pPr lvl="1"/>
             <a:r>
-              <a:rPr lang="en-CA" b="1" dirty="0" smtClean="0"/>
+              <a:rPr lang="en-CA" b="1" dirty="0"/>
               <a:t>Recommended calibration phantom for 30-90mm imaging depth</a:t>
             </a:r>
           </a:p>
           <a:p>
             <a:r>
-              <a:rPr lang="en-CA" dirty="0" smtClean="0">
+              <a:rPr lang="en-CA" dirty="0">
                 <a:hlinkClick r:id="rId3"/>
               </a:rPr>
               <a:t>Phantom model: fCal_3.0</a:t>
             </a:r>
-            <a:endParaRPr lang="en-CA" dirty="0" smtClean="0"/>
+            <a:endParaRPr lang="en-CA" dirty="0"/>
           </a:p>
           <a:p>
             <a:pPr lvl="1"/>
             <a:r>
-              <a:rPr lang="en-CA" dirty="0" smtClean="0"/>
+              <a:rPr lang="en-CA" dirty="0"/>
               <a:t>Experimental calibration phantom </a:t>
             </a:r>
             <a:br>
-              <a:rPr lang="en-CA" dirty="0" smtClean="0"/>
+              <a:rPr lang="en-CA" dirty="0"/>
             </a:br>
             <a:r>
-              <a:rPr lang="en-CA" dirty="0" smtClean="0"/>
+              <a:rPr lang="en-CA" dirty="0"/>
               <a:t>for &gt;90mm imaging depth</a:t>
             </a:r>
           </a:p>
           <a:p>
-            <a:endParaRPr lang="en-CA" dirty="0" smtClean="0"/>
+            <a:endParaRPr lang="en-CA" dirty="0"/>
           </a:p>
         </p:txBody>
       </p:sp>
@@ -3765,7 +3689,7 @@
           <a:lstStyle/>
           <a:p>
             <a:r>
-              <a:rPr lang="en-US" smtClean="0"/>
+              <a:rPr lang="en-US"/>
               <a:t>Laboratory for Percutaneous Surgery (The Perk Lab) – Copyright © Queen’s University, 2011</a:t>
             </a:r>
           </a:p>
@@ -4044,7 +3968,7 @@
               <a:buNone/>
             </a:pPr>
             <a:r>
-              <a:rPr lang="en-CA" dirty="0" smtClean="0"/>
+              <a:rPr lang="en-CA" dirty="0"/>
               <a:t>fCal_2.0</a:t>
             </a:r>
           </a:p>
@@ -4214,7 +4138,7 @@
               <a:buNone/>
             </a:pPr>
             <a:r>
-              <a:rPr lang="en-CA" dirty="0" smtClean="0"/>
+              <a:rPr lang="en-CA" dirty="0"/>
               <a:t>fCal_3.0</a:t>
             </a:r>
           </a:p>
@@ -4266,10 +4190,9 @@
           <a:lstStyle/>
           <a:p>
             <a:r>
-              <a:rPr lang="en-CA" dirty="0" smtClean="0"/>
+              <a:rPr lang="en-CA" dirty="0"/>
               <a:t>Print the phantom</a:t>
             </a:r>
-            <a:endParaRPr lang="en-CA" dirty="0"/>
           </a:p>
         </p:txBody>
       </p:sp>
@@ -4296,7 +4219,7 @@
           <a:lstStyle/>
           <a:p>
             <a:r>
-              <a:rPr lang="en-CA" dirty="0" smtClean="0"/>
+              <a:rPr lang="en-CA" dirty="0"/>
               <a:t>Download the phantom model in STL format from the repository:</a:t>
             </a:r>
           </a:p>
@@ -4305,52 +4228,46 @@
               <a:buNone/>
             </a:pPr>
             <a:r>
-              <a:rPr lang="en-CA" dirty="0" smtClean="0">
-                <a:hlinkClick r:id="rId2"/>
-              </a:rPr>
-              <a:t>https</a:t>
-            </a:r>
-            <a:r>
               <a:rPr lang="en-CA" dirty="0">
                 <a:hlinkClick r:id="rId2"/>
               </a:rPr>
-              <a:t>://subversion.assembla.com/svn/plus/trunk/PlusLib/data/CADModels/fCalPhantom/</a:t>
-            </a:r>
-            <a:endParaRPr lang="en-CA" dirty="0" smtClean="0"/>
-          </a:p>
-          <a:p>
-            <a:r>
-              <a:rPr lang="en-CA" dirty="0" smtClean="0"/>
+              <a:t>https://github.com/PlusToolkit/PlusLibData/tree/master/CADModels/fCalPhantom</a:t>
+            </a:r>
+            <a:endParaRPr lang="en-CA" dirty="0"/>
+          </a:p>
+          <a:p>
+            <a:r>
+              <a:rPr lang="en-CA" dirty="0"/>
               <a:t>You can have a look at the model file in </a:t>
             </a:r>
             <a:r>
-              <a:rPr lang="en-CA" dirty="0" smtClean="0">
+              <a:rPr lang="en-CA" dirty="0">
                 <a:hlinkClick r:id="rId3"/>
               </a:rPr>
               <a:t>3D Slicer</a:t>
             </a:r>
             <a:r>
-              <a:rPr lang="en-CA" dirty="0" smtClean="0"/>
+              <a:rPr lang="en-CA" dirty="0"/>
               <a:t> or </a:t>
             </a:r>
             <a:r>
-              <a:rPr lang="en-CA" dirty="0" smtClean="0">
+              <a:rPr lang="en-CA" dirty="0">
                 <a:hlinkClick r:id="rId4"/>
               </a:rPr>
               <a:t>Paraview</a:t>
             </a:r>
-            <a:endParaRPr lang="en-CA" dirty="0" smtClean="0"/>
-          </a:p>
-          <a:p>
-            <a:r>
-              <a:rPr lang="en-CA" dirty="0" smtClean="0"/>
+            <a:endParaRPr lang="en-CA" dirty="0"/>
+          </a:p>
+          <a:p>
+            <a:r>
+              <a:rPr lang="en-CA" dirty="0"/>
               <a:t>Print the STL file using a regular </a:t>
             </a:r>
             <a:br>
-              <a:rPr lang="en-CA" dirty="0" smtClean="0"/>
+              <a:rPr lang="en-CA" dirty="0"/>
             </a:br>
             <a:r>
-              <a:rPr lang="en-CA" dirty="0" smtClean="0"/>
+              <a:rPr lang="en-CA" dirty="0"/>
               <a:t>3D rapid prototyping printer</a:t>
             </a:r>
           </a:p>
@@ -4358,33 +4275,21 @@
             <a:pPr lvl="1"/>
             <a:r>
               <a:rPr lang="en-CA" dirty="0"/>
-              <a:t>FDM printing of dense ABS </a:t>
-            </a:r>
-            <a:r>
-              <a:rPr lang="en-CA" dirty="0" smtClean="0"/>
-              <a:t>plastic</a:t>
+              <a:t>FDM printing of dense ABS plastic</a:t>
             </a:r>
             <a:br>
-              <a:rPr lang="en-CA" dirty="0" smtClean="0"/>
+              <a:rPr lang="en-CA" dirty="0"/>
             </a:br>
             <a:r>
-              <a:rPr lang="en-CA" dirty="0" smtClean="0"/>
-              <a:t>is </a:t>
-            </a:r>
-            <a:r>
               <a:rPr lang="en-CA" dirty="0"/>
-              <a:t>recommended</a:t>
+              <a:t>is recommended</a:t>
             </a:r>
           </a:p>
           <a:p>
             <a:pPr lvl="1"/>
             <a:r>
               <a:rPr lang="en-CA" dirty="0"/>
-              <a:t>The cost should be </a:t>
-            </a:r>
-            <a:r>
-              <a:rPr lang="en-CA" dirty="0" smtClean="0"/>
-              <a:t>around $30-$150</a:t>
+              <a:t>The cost should be around $30-$150</a:t>
             </a:r>
           </a:p>
           <a:p>
@@ -4394,102 +4299,54 @@
               </a:lnSpc>
             </a:pPr>
             <a:r>
-              <a:rPr lang="en-CA" dirty="0" smtClean="0"/>
-              <a:t>If </a:t>
-            </a:r>
-            <a:r>
               <a:rPr lang="en-CA" dirty="0"/>
-              <a:t>you do not </a:t>
-            </a:r>
-            <a:r>
-              <a:rPr lang="en-CA" dirty="0" smtClean="0"/>
-              <a:t>have access to a</a:t>
-            </a:r>
-            <a:br>
-              <a:rPr lang="en-CA" dirty="0" smtClean="0"/>
-            </a:br>
-            <a:r>
-              <a:rPr lang="en-CA" dirty="0" smtClean="0"/>
-              <a:t>3D printer know or the local</a:t>
-            </a:r>
-            <a:br>
-              <a:rPr lang="en-CA" dirty="0" smtClean="0"/>
-            </a:br>
-            <a:r>
-              <a:rPr lang="en-CA" dirty="0" smtClean="0"/>
-              <a:t>3D </a:t>
-            </a:r>
-            <a:r>
-              <a:rPr lang="en-CA" dirty="0"/>
-              <a:t>printing </a:t>
-            </a:r>
-            <a:r>
-              <a:rPr lang="en-CA" dirty="0" smtClean="0"/>
-              <a:t>shops are expensive</a:t>
-            </a:r>
-            <a:br>
-              <a:rPr lang="en-CA" dirty="0" smtClean="0"/>
-            </a:br>
-            <a:r>
-              <a:rPr lang="en-CA" dirty="0" smtClean="0"/>
-              <a:t>then </a:t>
-            </a:r>
-            <a:r>
-              <a:rPr lang="en-CA" dirty="0"/>
-              <a:t>you can </a:t>
-            </a:r>
-            <a:r>
-              <a:rPr lang="en-CA" dirty="0" smtClean="0"/>
-              <a:t>just upload </a:t>
-            </a:r>
-            <a:r>
-              <a:rPr lang="en-CA" dirty="0"/>
-              <a:t>your </a:t>
-            </a:r>
-            <a:r>
-              <a:rPr lang="en-CA" dirty="0" smtClean="0"/>
-              <a:t>model</a:t>
-            </a:r>
-            <a:br>
-              <a:rPr lang="en-CA" dirty="0" smtClean="0"/>
-            </a:br>
-            <a:r>
-              <a:rPr lang="en-CA" dirty="0" smtClean="0"/>
-              <a:t>and get it by post within a couple of days:</a:t>
-            </a:r>
-            <a:br>
-              <a:rPr lang="en-CA" dirty="0" smtClean="0"/>
-            </a:br>
-            <a:r>
-              <a:rPr lang="en-CA" dirty="0" smtClean="0">
-                <a:hlinkClick r:id="rId5"/>
-              </a:rPr>
-              <a:t>http</a:t>
-            </a:r>
-            <a:r>
-              <a:rPr lang="en-CA" dirty="0">
-                <a:hlinkClick r:id="rId5"/>
-              </a:rPr>
-              <a:t>://3dprintingpricecheck.com/</a:t>
-            </a:r>
-            <a:r>
-              <a:rPr lang="en-CA" dirty="0"/>
-              <a:t/>
+              <a:t>If you do not have access to a</a:t>
             </a:r>
             <a:br>
               <a:rPr lang="en-CA" dirty="0"/>
             </a:br>
             <a:r>
+              <a:rPr lang="en-CA" dirty="0"/>
+              <a:t>3D printer know or the local</a:t>
+            </a:r>
+            <a:br>
+              <a:rPr lang="en-CA" dirty="0"/>
+            </a:br>
+            <a:r>
+              <a:rPr lang="en-CA" dirty="0"/>
+              <a:t>3D printing shops are expensive</a:t>
+            </a:r>
+            <a:br>
+              <a:rPr lang="en-CA" dirty="0"/>
+            </a:br>
+            <a:r>
+              <a:rPr lang="en-CA" dirty="0"/>
+              <a:t>then you can just upload your model</a:t>
+            </a:r>
+            <a:br>
+              <a:rPr lang="en-CA" dirty="0"/>
+            </a:br>
+            <a:r>
+              <a:rPr lang="en-CA" dirty="0"/>
+              <a:t>and get it by post within a couple of days:</a:t>
+            </a:r>
+            <a:br>
+              <a:rPr lang="en-CA" dirty="0"/>
+            </a:br>
+            <a:r>
+              <a:rPr lang="en-CA" dirty="0">
+                <a:hlinkClick r:id="rId5"/>
+              </a:rPr>
+              <a:t>http://3dprintingpricecheck.com/</a:t>
+            </a:r>
+            <a:br>
+              <a:rPr lang="en-CA" dirty="0"/>
+            </a:br>
+            <a:r>
               <a:rPr lang="en-US" dirty="0">
                 <a:hlinkClick r:id="rId6"/>
               </a:rPr>
-              <a:t>http://</a:t>
-            </a:r>
-            <a:r>
-              <a:rPr lang="en-US" dirty="0" smtClean="0">
-                <a:hlinkClick r:id="rId6"/>
-              </a:rPr>
-              <a:t>www.3ders.org/3d-printing/3d-print-services.html</a:t>
+              <a:t>http://www.3ders.org/3d-printing/3d-print-services.html</a:t>
             </a:r>
             <a:endParaRPr lang="en-CA" dirty="0"/>
           </a:p>
@@ -4511,7 +4368,7 @@
           <a:lstStyle/>
           <a:p>
             <a:r>
-              <a:rPr lang="en-US" smtClean="0"/>
+              <a:rPr lang="en-US"/>
               <a:t>Laboratory for Percutaneous Surgery (The Perk Lab) – Copyright © Queen’s University, 2011</a:t>
             </a:r>
           </a:p>
@@ -4584,13 +4441,6 @@
   <p:clrMapOvr>
     <a:masterClrMapping/>
   </p:clrMapOvr>
-  <p:timing>
-    <p:tnLst>
-      <p:par>
-        <p:cTn id="1" dur="indefinite" restart="never" nodeType="tmRoot"/>
-      </p:par>
-    </p:tnLst>
-  </p:timing>
 </p:sld>
 </file>
 
@@ -4629,10 +4479,9 @@
           <a:lstStyle/>
           <a:p>
             <a:r>
-              <a:rPr lang="en-CA" dirty="0" smtClean="0"/>
+              <a:rPr lang="en-CA" dirty="0"/>
               <a:t>Insert fiducial lines into the phantom</a:t>
             </a:r>
-            <a:endParaRPr lang="en-CA" dirty="0"/>
           </a:p>
         </p:txBody>
       </p:sp>
@@ -4659,77 +4508,34 @@
           <a:lstStyle/>
           <a:p>
             <a:r>
-              <a:rPr lang="en-CA" sz="1400" dirty="0" smtClean="0"/>
+              <a:rPr lang="en-CA" sz="1400" dirty="0"/>
               <a:t>Fiducial line material: regular fishing line, about 0.2-0.3 mm diameter</a:t>
             </a:r>
           </a:p>
           <a:p>
             <a:r>
-              <a:rPr lang="en-CA" sz="1400" dirty="0" smtClean="0"/>
+              <a:rPr lang="en-CA" sz="1400" dirty="0"/>
               <a:t>The endpoints of the fiducial lines shall correspond to the description in the device set configuration XML file, such as: </a:t>
-            </a:r>
-            <a:r>
-              <a:rPr lang="en-CA" sz="900" dirty="0" smtClean="0">
-                <a:hlinkClick r:id="rId2"/>
-              </a:rPr>
-              <a:t>https</a:t>
             </a:r>
             <a:r>
               <a:rPr lang="en-CA" sz="900" dirty="0">
                 <a:hlinkClick r:id="rId2"/>
               </a:rPr>
-              <a:t>://</a:t>
-            </a:r>
-            <a:r>
-              <a:rPr lang="en-CA" sz="900" dirty="0" smtClean="0">
-                <a:hlinkClick r:id="rId2"/>
-              </a:rPr>
-              <a:t>subversion.assembla.com/svn/plus/trunk/PlusLib/data/ConfigFiles/PlusConfiguration_SonixTouch_Ascension3DG_L14_fCal2.0.xml</a:t>
+              <a:t>https://github.com/PlusToolkit/PlusLibData/blob/master/ConfigFiles/PlusDeviceSet_fCal_Ultrasonix_L14-5_Ascension3DG_2.0.xml</a:t>
             </a:r>
             <a:endParaRPr lang="en-CA" sz="1400" dirty="0"/>
           </a:p>
           <a:p>
             <a:r>
-              <a:rPr lang="en-CA" sz="1400" dirty="0" smtClean="0"/>
-              <a:t>The screenshots available at </a:t>
-            </a:r>
-            <a:r>
-              <a:rPr lang="en-US" sz="1200" dirty="0">
-                <a:hlinkClick r:id="rId3"/>
-              </a:rPr>
-              <a:t>https://</a:t>
-            </a:r>
-            <a:r>
-              <a:rPr lang="en-US" sz="1200" dirty="0" smtClean="0">
-                <a:hlinkClick r:id="rId3"/>
-              </a:rPr>
-              <a:t>subversion.assembla.com/svn/plus/trunk/doc/specifications/fCalPhantom</a:t>
-            </a:r>
-            <a:r>
-              <a:rPr lang="en-US" sz="1400" dirty="0" smtClean="0"/>
-              <a:t> can also be helpful in verifying that the </a:t>
-            </a:r>
-            <a:r>
-              <a:rPr lang="en-US" sz="1400" dirty="0" err="1" smtClean="0"/>
-              <a:t>fiducial</a:t>
-            </a:r>
-            <a:r>
-              <a:rPr lang="en-US" sz="1400" dirty="0" smtClean="0"/>
-              <a:t> lines have been inserted correctly</a:t>
-            </a:r>
-            <a:endParaRPr lang="en-CA" sz="1400" dirty="0" smtClean="0"/>
-          </a:p>
-          <a:p>
-            <a:r>
-              <a:rPr lang="en-CA" sz="1400" dirty="0" smtClean="0"/>
+              <a:rPr lang="en-CA" sz="1400" dirty="0"/>
               <a:t>The automatic calibration method in </a:t>
             </a:r>
             <a:r>
-              <a:rPr lang="en-CA" sz="1400" dirty="0" err="1" smtClean="0"/>
+              <a:rPr lang="en-CA" sz="1400" dirty="0" err="1"/>
               <a:t>fCal</a:t>
             </a:r>
             <a:r>
-              <a:rPr lang="en-CA" sz="1400" dirty="0" smtClean="0"/>
+              <a:rPr lang="en-CA" sz="1400" dirty="0"/>
               <a:t> supports a fiducial line structure containing any number of parallel N patterns.</a:t>
             </a:r>
           </a:p>
@@ -4751,7 +4557,7 @@
           <a:lstStyle/>
           <a:p>
             <a:r>
-              <a:rPr lang="en-US" smtClean="0"/>
+              <a:rPr lang="en-US"/>
               <a:t>Laboratory for Percutaneous Surgery (The Perk Lab) – Copyright © Queen’s University, 2011</a:t>
             </a:r>
           </a:p>
@@ -4769,7 +4575,7 @@
           <p:nvPr/>
         </p:nvPicPr>
         <p:blipFill>
-          <a:blip r:embed="rId4" cstate="print"/>
+          <a:blip r:embed="rId3" cstate="print"/>
           <a:srcRect l="16936" t="14976" r="33666" b="10146"/>
           <a:stretch>
             <a:fillRect/>
@@ -4811,7 +4617,7 @@
         </p:spPr>
         <p:txBody>
           <a:bodyPr vert="horz" lIns="91440" tIns="45720" rIns="91440" bIns="45720" rtlCol="0">
-            <a:normAutofit fontScale="47500" lnSpcReduction="20000"/>
+            <a:normAutofit fontScale="40000" lnSpcReduction="20000"/>
           </a:bodyPr>
           <a:lstStyle/>
           <a:p>
@@ -4831,7 +4637,7 @@
               <a:defRPr/>
             </a:pPr>
             <a:r>
-              <a:rPr kumimoji="0" lang="en-US" sz="2400" b="0" i="0" u="none" strike="noStrike" kern="1200" cap="none" spc="0" normalizeH="0" baseline="0" noProof="0" dirty="0" smtClean="0">
+              <a:rPr kumimoji="0" lang="en-US" sz="2400" b="0" i="0" u="none" strike="noStrike" kern="1200" cap="none" spc="0" normalizeH="0" baseline="0" noProof="0" dirty="0">
                 <a:ln>
                   <a:noFill/>
                 </a:ln>
@@ -4877,7 +4683,7 @@
               <a:defRPr/>
             </a:pPr>
             <a:r>
-              <a:rPr kumimoji="0" lang="en-US" sz="1400" b="0" i="0" u="none" strike="noStrike" kern="1200" cap="none" spc="0" normalizeH="0" baseline="0" noProof="0" dirty="0" smtClean="0">
+              <a:rPr kumimoji="0" lang="en-US" sz="1400" b="0" i="0" u="none" strike="noStrike" kern="1200" cap="none" spc="0" normalizeH="0" baseline="0" noProof="0" dirty="0">
                 <a:ln>
                   <a:noFill/>
                 </a:ln>
@@ -4894,7 +4700,7 @@
               <a:t>The 3D coordinates of the </a:t>
             </a:r>
             <a:r>
-              <a:rPr kumimoji="0" lang="en-US" sz="1400" b="0" i="0" u="none" strike="noStrike" kern="1200" cap="none" spc="0" normalizeH="0" baseline="0" noProof="0" dirty="0" err="1" smtClean="0">
+              <a:rPr kumimoji="0" lang="en-US" sz="1400" b="0" i="0" u="none" strike="noStrike" kern="1200" cap="none" spc="0" normalizeH="0" baseline="0" noProof="0" dirty="0" err="1">
                 <a:ln>
                   <a:noFill/>
                 </a:ln>
@@ -4911,7 +4717,7 @@
               <a:t>EndPoints</a:t>
             </a:r>
             <a:r>
-              <a:rPr kumimoji="0" lang="en-US" sz="1400" b="0" i="0" u="none" strike="noStrike" kern="1200" cap="none" spc="0" normalizeH="0" baseline="0" noProof="0" dirty="0" smtClean="0">
+              <a:rPr kumimoji="0" lang="en-US" sz="1400" b="0" i="0" u="none" strike="noStrike" kern="1200" cap="none" spc="0" normalizeH="0" baseline="0" noProof="0" dirty="0">
                 <a:ln>
                   <a:noFill/>
                 </a:ln>
@@ -4928,7 +4734,7 @@
               <a:t> are defined in the </a:t>
             </a:r>
             <a:r>
-              <a:rPr kumimoji="0" lang="en-US" sz="1400" b="0" i="1" u="none" strike="noStrike" kern="1200" cap="none" spc="0" normalizeH="0" baseline="0" noProof="0" dirty="0" smtClean="0">
+              <a:rPr kumimoji="0" lang="en-US" sz="1400" b="0" i="1" u="none" strike="noStrike" kern="1200" cap="none" spc="0" normalizeH="0" baseline="0" noProof="0" dirty="0">
                 <a:ln>
                   <a:noFill/>
                 </a:ln>
@@ -4945,7 +4751,7 @@
               <a:t>Phantom </a:t>
             </a:r>
             <a:r>
-              <a:rPr kumimoji="0" lang="en-US" sz="1400" b="0" i="0" u="none" strike="noStrike" kern="1200" cap="none" spc="0" normalizeH="0" baseline="0" noProof="0" dirty="0" smtClean="0">
+              <a:rPr kumimoji="0" lang="en-US" sz="1400" b="0" i="0" u="none" strike="noStrike" kern="1200" cap="none" spc="0" normalizeH="0" baseline="0" noProof="0" dirty="0">
                 <a:ln>
                   <a:noFill/>
                 </a:ln>
@@ -4962,7 +4768,7 @@
               <a:t>coordinate system. The </a:t>
             </a:r>
             <a:r>
-              <a:rPr kumimoji="0" lang="en-US" sz="1400" b="0" i="1" u="none" strike="noStrike" kern="1200" cap="none" spc="0" normalizeH="0" baseline="0" noProof="0" dirty="0" smtClean="0">
+              <a:rPr kumimoji="0" lang="en-US" sz="1400" b="0" i="1" u="none" strike="noStrike" kern="1200" cap="none" spc="0" normalizeH="0" baseline="0" noProof="0" dirty="0">
                 <a:ln>
                   <a:noFill/>
                 </a:ln>
@@ -4979,7 +4785,7 @@
               <a:t>Phantom</a:t>
             </a:r>
             <a:r>
-              <a:rPr kumimoji="0" lang="en-US" sz="1400" b="0" i="0" u="none" strike="noStrike" kern="1200" cap="none" spc="0" normalizeH="0" baseline="0" noProof="0" dirty="0" smtClean="0">
+              <a:rPr kumimoji="0" lang="en-US" sz="1400" b="0" i="0" u="none" strike="noStrike" kern="1200" cap="none" spc="0" normalizeH="0" baseline="0" noProof="0" dirty="0">
                 <a:ln>
                   <a:noFill/>
                 </a:ln>
@@ -4997,18 +4803,10 @@
             </a:r>
             <a:r>
               <a:rPr lang="en-US" sz="1400" dirty="0"/>
-              <a:t>left hole (on fCal-2.x it is the A5</a:t>
-            </a:r>
-            <a:r>
-              <a:rPr lang="en-US" sz="1400" dirty="0" smtClean="0"/>
-              <a:t>), </a:t>
-            </a:r>
-            <a:r>
-              <a:rPr lang="en-US" sz="1400" dirty="0"/>
-              <a:t>inside </a:t>
-            </a:r>
-            <a:r>
-              <a:rPr kumimoji="0" lang="en-US" sz="1400" b="0" i="0" u="none" strike="noStrike" kern="1200" cap="none" spc="0" normalizeH="0" baseline="0" noProof="0" dirty="0" smtClean="0">
+              <a:t>left hole (on fCal-2.x it is the A5), inside </a:t>
+            </a:r>
+            <a:r>
+              <a:rPr kumimoji="0" lang="en-US" sz="1400" b="0" i="0" u="none" strike="noStrike" kern="1200" cap="none" spc="0" normalizeH="0" baseline="0" noProof="0" dirty="0">
                 <a:ln>
                   <a:noFill/>
                 </a:ln>
@@ -5033,7 +4831,7 @@
               <a:defRPr/>
             </a:pPr>
             <a:r>
-              <a:rPr kumimoji="0" lang="en-US" sz="1400" b="0" i="0" u="none" strike="noStrike" kern="1200" cap="none" spc="0" normalizeH="0" baseline="0" noProof="0" dirty="0" smtClean="0">
+              <a:rPr kumimoji="0" lang="en-US" sz="1400" b="0" i="0" u="none" strike="noStrike" kern="1200" cap="none" spc="0" normalizeH="0" baseline="0" noProof="0" dirty="0">
                 <a:ln>
                   <a:noFill/>
                 </a:ln>
@@ -5050,7 +4848,7 @@
               <a:t>See the image on the right or the coordinate system definition model here for more information:</a:t>
             </a:r>
             <a:br>
-              <a:rPr kumimoji="0" lang="en-US" sz="1400" b="0" i="0" u="none" strike="noStrike" kern="1200" cap="none" spc="0" normalizeH="0" baseline="0" noProof="0" dirty="0" smtClean="0">
+              <a:rPr kumimoji="0" lang="en-US" sz="1400" b="0" i="0" u="none" strike="noStrike" kern="1200" cap="none" spc="0" normalizeH="0" baseline="0" noProof="0" dirty="0">
                 <a:ln>
                   <a:noFill/>
                 </a:ln>
@@ -5067,11 +4865,11 @@
             </a:br>
             <a:r>
               <a:rPr lang="en-US" sz="1000" dirty="0">
-                <a:hlinkClick r:id="rId5"/>
-              </a:rPr>
-              <a:t>https://www.assembla.com/spaces/plus/wiki/Coordinate_system_definitions</a:t>
-            </a:r>
-            <a:endParaRPr lang="en-US" sz="1000" dirty="0" smtClean="0"/>
+                <a:hlinkClick r:id="rId4"/>
+              </a:rPr>
+              <a:t>http://perk-software.cs.queensu.ca/plus/doc/nightly/user/ApplicationfCalCoordinateSystemDefinitions.html</a:t>
+            </a:r>
+            <a:endParaRPr lang="en-US" sz="1000" dirty="0"/>
           </a:p>
         </p:txBody>
       </p:sp>
@@ -5116,7 +4914,7 @@
               <a:defRPr/>
             </a:pPr>
             <a:r>
-              <a:rPr kumimoji="0" lang="en-US" sz="1100" b="1" i="0" u="none" strike="noStrike" kern="1200" cap="none" spc="0" normalizeH="0" baseline="0" noProof="0" dirty="0" smtClean="0">
+              <a:rPr kumimoji="0" lang="en-US" sz="1100" b="1" i="0" u="none" strike="noStrike" kern="1200" cap="none" spc="0" normalizeH="0" baseline="0" noProof="0" dirty="0">
                 <a:ln>
                   <a:noFill/>
                 </a:ln>
@@ -5140,7 +4938,7 @@
               <a:defRPr/>
             </a:pPr>
             <a:r>
-              <a:rPr kumimoji="0" lang="en-US" sz="700" b="1" i="0" u="none" strike="noStrike" kern="1200" cap="none" spc="0" normalizeH="0" baseline="0" noProof="0" dirty="0" smtClean="0">
+              <a:rPr kumimoji="0" lang="en-US" sz="700" b="1" i="0" u="none" strike="noStrike" kern="1200" cap="none" spc="0" normalizeH="0" baseline="0" noProof="0" dirty="0">
                 <a:ln>
                   <a:noFill/>
                 </a:ln>
@@ -5156,7 +4954,7 @@
               <a:t>&lt;Geometry&gt;</a:t>
             </a:r>
             <a:br>
-              <a:rPr kumimoji="0" lang="en-US" sz="700" b="1" i="0" u="none" strike="noStrike" kern="1200" cap="none" spc="0" normalizeH="0" baseline="0" noProof="0" dirty="0" smtClean="0">
+              <a:rPr kumimoji="0" lang="en-US" sz="700" b="1" i="0" u="none" strike="noStrike" kern="1200" cap="none" spc="0" normalizeH="0" baseline="0" noProof="0" dirty="0">
                 <a:ln>
                   <a:noFill/>
                 </a:ln>
@@ -5348,21 +5146,7 @@
                 <a:latin typeface="Courier New" pitchFamily="49" charset="0"/>
                 <a:cs typeface="Courier New" pitchFamily="49" charset="0"/>
               </a:rPr>
-              <a:t>   </a:t>
-            </a:r>
-            <a:r>
-              <a:rPr lang="en-US" sz="700" b="1" dirty="0" smtClean="0">
-                <a:latin typeface="Courier New" pitchFamily="49" charset="0"/>
-                <a:cs typeface="Courier New" pitchFamily="49" charset="0"/>
-              </a:rPr>
-              <a:t>   </a:t>
-            </a:r>
-            <a:r>
-              <a:rPr lang="en-US" sz="700" b="1" dirty="0">
-                <a:latin typeface="Courier New" pitchFamily="49" charset="0"/>
-                <a:cs typeface="Courier New" pitchFamily="49" charset="0"/>
-              </a:rPr>
-              <a:t>&lt;Pattern Type="</a:t>
+              <a:t>      &lt;Pattern Type="</a:t>
             </a:r>
             <a:r>
               <a:rPr lang="en-US" sz="700" b="1" dirty="0" err="1">
@@ -5695,7 +5479,7 @@
               </a:rPr>
               <a:t>      &lt;/Pattern&gt;</a:t>
             </a:r>
-            <a:endParaRPr kumimoji="0" lang="en-US" sz="700" b="1" i="0" u="none" strike="noStrike" kern="1200" cap="none" spc="0" normalizeH="0" baseline="0" noProof="0" dirty="0" smtClean="0">
+            <a:endParaRPr kumimoji="0" lang="en-US" sz="700" b="1" i="0" u="none" strike="noStrike" kern="1200" cap="none" spc="0" normalizeH="0" baseline="0" noProof="0" dirty="0">
               <a:ln>
                 <a:noFill/>
               </a:ln>
@@ -5728,7 +5512,7 @@
               <a:defRPr/>
             </a:pPr>
             <a:r>
-              <a:rPr kumimoji="0" lang="en-US" sz="700" b="1" i="0" u="none" strike="noStrike" kern="1200" cap="none" spc="0" normalizeH="0" baseline="0" noProof="0" dirty="0" smtClean="0">
+              <a:rPr kumimoji="0" lang="en-US" sz="700" b="1" i="0" u="none" strike="noStrike" kern="1200" cap="none" spc="0" normalizeH="0" baseline="0" noProof="0" dirty="0">
                 <a:ln>
                   <a:noFill/>
                 </a:ln>
@@ -5763,7 +5547,7 @@
               <a:defRPr/>
             </a:pPr>
             <a:r>
-              <a:rPr kumimoji="0" lang="en-US" sz="700" b="1" i="0" u="none" strike="noStrike" kern="1200" cap="none" spc="0" normalizeH="0" baseline="0" noProof="0" dirty="0" smtClean="0">
+              <a:rPr kumimoji="0" lang="en-US" sz="700" b="1" i="0" u="none" strike="noStrike" kern="1200" cap="none" spc="0" normalizeH="0" baseline="0" noProof="0" dirty="0">
                 <a:ln>
                   <a:noFill/>
                 </a:ln>
@@ -5778,7 +5562,7 @@
               </a:rPr>
               <a:t>&lt;/Geometry&gt;</a:t>
             </a:r>
-            <a:endParaRPr kumimoji="0" lang="en-US" sz="1400" b="0" i="0" u="none" strike="noStrike" kern="1200" cap="none" spc="0" normalizeH="0" baseline="0" noProof="0" dirty="0" smtClean="0">
+            <a:endParaRPr kumimoji="0" lang="en-US" sz="1400" b="0" i="0" u="none" strike="noStrike" kern="1200" cap="none" spc="0" normalizeH="0" baseline="0" noProof="0" dirty="0">
               <a:ln>
                 <a:noFill/>
               </a:ln>
@@ -5804,13 +5588,6 @@
   <p:clrMapOvr>
     <a:masterClrMapping/>
   </p:clrMapOvr>
-  <p:timing>
-    <p:tnLst>
-      <p:par>
-        <p:cTn id="1" dur="indefinite" restart="never" nodeType="tmRoot"/>
-      </p:par>
-    </p:tnLst>
-  </p:timing>
 </p:sld>
 </file>
 
@@ -5847,10 +5624,9 @@
           <a:lstStyle/>
           <a:p>
             <a:r>
-              <a:rPr lang="en-US" dirty="0" smtClean="0"/>
+              <a:rPr lang="en-US" dirty="0"/>
               <a:t>Line stretching</a:t>
             </a:r>
-            <a:endParaRPr lang="en-US" dirty="0"/>
           </a:p>
         </p:txBody>
       </p:sp>
@@ -5877,47 +5653,39 @@
           <a:lstStyle/>
           <a:p>
             <a:r>
-              <a:rPr lang="en-US" dirty="0" smtClean="0"/>
+              <a:rPr lang="en-US" dirty="0"/>
               <a:t>The fiducial lines should be stretched enough to be completely straight (the stretching has negligible effect on the line visibility, so it is enough to stretch it just so that it is straight)</a:t>
             </a:r>
           </a:p>
           <a:p>
             <a:r>
-              <a:rPr lang="en-US" dirty="0" smtClean="0"/>
-              <a:t>You can stretch the fiducial lines by using a rubber band as it is shown in the picture </a:t>
-            </a:r>
-            <a:r>
-              <a:rPr lang="en-US" dirty="0" smtClean="0"/>
-              <a:t>below</a:t>
+              <a:rPr lang="en-US" dirty="0"/>
+              <a:t>You can stretch the fiducial lines by using a rubber band as it is shown in the picture below</a:t>
             </a:r>
           </a:p>
           <a:p>
             <a:endParaRPr lang="en-US" dirty="0"/>
           </a:p>
           <a:p>
-            <a:endParaRPr lang="en-US" dirty="0" smtClean="0"/>
-          </a:p>
-          <a:p>
-            <a:endParaRPr lang="en-US" dirty="0" smtClean="0"/>
+            <a:endParaRPr lang="en-US" dirty="0"/>
+          </a:p>
+          <a:p>
+            <a:endParaRPr lang="en-US" dirty="0"/>
           </a:p>
           <a:p>
             <a:r>
               <a:rPr lang="en-US" dirty="0"/>
-              <a:t>Slanted holes in fCal_2.x and later phantoms take care of line alignment within a </a:t>
-            </a:r>
-            <a:r>
-              <a:rPr lang="en-US" dirty="0" smtClean="0"/>
-              <a:t>hole.</a:t>
-            </a:r>
-          </a:p>
-          <a:p>
-            <a:endParaRPr lang="en-US" dirty="0" smtClean="0"/>
-          </a:p>
-          <a:p>
-            <a:endParaRPr lang="en-US" dirty="0" smtClean="0"/>
-          </a:p>
-          <a:p>
-            <a:endParaRPr lang="en-US" dirty="0" smtClean="0"/>
+              <a:t>Slanted holes in fCal_2.x and later phantoms take care of line alignment within a hole.</a:t>
+            </a:r>
+          </a:p>
+          <a:p>
+            <a:endParaRPr lang="en-US" dirty="0"/>
+          </a:p>
+          <a:p>
+            <a:endParaRPr lang="en-US" dirty="0"/>
+          </a:p>
+          <a:p>
+            <a:endParaRPr lang="en-US" dirty="0"/>
           </a:p>
           <a:p>
             <a:endParaRPr lang="en-US" dirty="0"/>
@@ -5940,7 +5708,7 @@
           <a:lstStyle/>
           <a:p>
             <a:r>
-              <a:rPr lang="en-US" smtClean="0"/>
+              <a:rPr lang="en-US"/>
               <a:t>Laboratory for Percutaneous Surgery (The Perk Lab) – Copyright © Queen’s University, 2011</a:t>
             </a:r>
           </a:p>
@@ -6062,14 +5830,14 @@
                 <a:defRPr/>
               </a:pPr>
               <a:r>
-                <a:rPr lang="en-US" sz="1600" dirty="0" smtClean="0">
+                <a:rPr lang="en-US" sz="1600" dirty="0">
                   <a:solidFill>
                     <a:srgbClr val="FF0000"/>
                   </a:solidFill>
                 </a:rPr>
                 <a:t>Stretching</a:t>
               </a:r>
-              <a:endParaRPr kumimoji="0" lang="en-US" sz="1600" b="0" i="0" u="none" strike="noStrike" kern="1200" cap="none" spc="0" normalizeH="0" baseline="0" noProof="0" dirty="0" smtClean="0">
+              <a:endParaRPr kumimoji="0" lang="en-US" sz="1600" b="0" i="0" u="none" strike="noStrike" kern="1200" cap="none" spc="0" normalizeH="0" baseline="0" noProof="0" dirty="0">
                 <a:ln>
                   <a:noFill/>
                 </a:ln>
@@ -6097,13 +5865,6 @@
   <p:clrMapOvr>
     <a:masterClrMapping/>
   </p:clrMapOvr>
-  <p:timing>
-    <p:tnLst>
-      <p:par>
-        <p:cTn id="1" dur="indefinite" restart="never" nodeType="tmRoot"/>
-      </p:par>
-    </p:tnLst>
-  </p:timing>
 </p:sld>
 </file>
 
@@ -6140,10 +5901,9 @@
           <a:lstStyle/>
           <a:p>
             <a:r>
-              <a:rPr lang="en-US" dirty="0" smtClean="0"/>
+              <a:rPr lang="en-US" dirty="0"/>
               <a:t>Appendix</a:t>
             </a:r>
-            <a:endParaRPr lang="en-US" dirty="0"/>
           </a:p>
         </p:txBody>
       </p:sp>
@@ -6163,7 +5923,7 @@
           <a:lstStyle/>
           <a:p>
             <a:r>
-              <a:rPr lang="en-US" smtClean="0"/>
+              <a:rPr lang="en-US"/>
               <a:t>Laboratory for Percutaneous Surgery (The Perk Lab) – Copyright © Queen’s University, 2011</a:t>
             </a:r>
           </a:p>
@@ -6250,7 +6010,7 @@
           <a:lstStyle/>
           <a:p>
             <a:r>
-              <a:rPr lang="en-CA" dirty="0" smtClean="0">
+              <a:rPr lang="en-CA" dirty="0">
                 <a:solidFill>
                   <a:schemeClr val="bg1">
                     <a:lumMod val="65000"/>
@@ -6260,7 +6020,7 @@
               </a:rPr>
               <a:t>Phantom model: fCal_1.0, Wiring: wiring_1.x</a:t>
             </a:r>
-            <a:endParaRPr lang="en-CA" dirty="0" smtClean="0">
+            <a:endParaRPr lang="en-CA" dirty="0">
               <a:solidFill>
                 <a:schemeClr val="bg1">
                   <a:lumMod val="65000"/>
@@ -6271,7 +6031,7 @@
           <a:p>
             <a:pPr lvl="1"/>
             <a:r>
-              <a:rPr lang="en-CA" dirty="0" smtClean="0"/>
+              <a:rPr lang="en-CA" dirty="0"/>
               <a:t>obsolete, use fCal_2.0 instead</a:t>
             </a:r>
           </a:p>
@@ -6293,7 +6053,7 @@
           <a:lstStyle/>
           <a:p>
             <a:r>
-              <a:rPr lang="en-US" smtClean="0"/>
+              <a:rPr lang="en-US"/>
               <a:t>Laboratory for Percutaneous Surgery (The Perk Lab) – Copyright © Queen’s University, 2011</a:t>
             </a:r>
           </a:p>
@@ -6402,10 +6162,9 @@
           <a:lstStyle/>
           <a:p>
             <a:r>
-              <a:rPr lang="en-US" dirty="0" smtClean="0"/>
+              <a:rPr lang="en-US" dirty="0"/>
               <a:t>Line alignment</a:t>
             </a:r>
-            <a:endParaRPr lang="en-US" dirty="0"/>
           </a:p>
         </p:txBody>
       </p:sp>
@@ -6432,48 +6191,47 @@
           <a:lstStyle/>
           <a:p>
             <a:r>
-              <a:rPr lang="en-US" dirty="0" smtClean="0"/>
+              <a:rPr lang="en-US" dirty="0"/>
               <a:t>Line alignment is </a:t>
             </a:r>
             <a:r>
-              <a:rPr lang="en-US" b="1" dirty="0" smtClean="0"/>
+              <a:rPr lang="en-US" b="1" dirty="0"/>
               <a:t>only an issue for fCal_1.x phantoms</a:t>
             </a:r>
             <a:r>
-              <a:rPr lang="en-US" dirty="0" smtClean="0"/>
+              <a:rPr lang="en-US" dirty="0"/>
               <a:t>. Slanted holes in fCal_2.x and later phantoms take care of line alignment within a hole.</a:t>
             </a:r>
+          </a:p>
+          <a:p>
+            <a:r>
+              <a:rPr lang="en-US" dirty="0"/>
+              <a:t>The fiducial line has a much smaller diameter than the printed holes, therefore it makes a big difference which side of the hole the line is aligned to</a:t>
+            </a:r>
+          </a:p>
+          <a:p>
+            <a:r>
+              <a:rPr lang="en-US" dirty="0"/>
+              <a:t>All the lines are aligned to the same side of the holes. This ensures that the distance between the lines remain the same.</a:t>
+            </a:r>
+          </a:p>
+          <a:p>
+            <a:r>
+              <a:rPr lang="en-US" dirty="0"/>
+              <a:t>By convention, we always align the lines to the left side of the holes for parallel wires (wire 1, 3, 4, 6)</a:t>
+            </a:r>
+          </a:p>
+          <a:p>
+            <a:r>
+              <a:rPr lang="en-US" dirty="0"/>
+              <a:t>Due to the thickness of the phantom wall, the diagonal wires (wire 2, 5) can only be aligned in one way (towards the center of the phantom)</a:t>
+            </a:r>
+          </a:p>
+          <a:p>
             <a:endParaRPr lang="en-US" dirty="0"/>
           </a:p>
           <a:p>
-            <a:r>
-              <a:rPr lang="en-US" dirty="0" smtClean="0"/>
-              <a:t>The fiducial line has a much smaller diameter than the printed holes, therefore it makes a big difference which side of the hole the line is aligned to</a:t>
-            </a:r>
-          </a:p>
-          <a:p>
-            <a:r>
-              <a:rPr lang="en-US" dirty="0" smtClean="0"/>
-              <a:t>All the lines are aligned to the same side of the holes. This ensures that the distance between the lines remain the same.</a:t>
-            </a:r>
-          </a:p>
-          <a:p>
-            <a:r>
-              <a:rPr lang="en-US" dirty="0" smtClean="0"/>
-              <a:t>By convention, we always align the lines to the left side of the holes for parallel wires (wire 1, 3, 4, 6)</a:t>
-            </a:r>
-          </a:p>
-          <a:p>
-            <a:r>
-              <a:rPr lang="en-US" dirty="0" smtClean="0"/>
-              <a:t>Due to the thickness of the phantom wall, the diagonal wires (wire 2, 5) can only be aligned in one way (towards the center of the phantom)</a:t>
-            </a:r>
-          </a:p>
-          <a:p>
-            <a:endParaRPr lang="en-US" dirty="0" smtClean="0"/>
-          </a:p>
-          <a:p>
-            <a:endParaRPr lang="en-US" dirty="0" smtClean="0"/>
+            <a:endParaRPr lang="en-US" dirty="0"/>
           </a:p>
           <a:p>
             <a:endParaRPr lang="en-US" dirty="0"/>
@@ -6496,7 +6254,7 @@
           <a:lstStyle/>
           <a:p>
             <a:r>
-              <a:rPr lang="en-US" smtClean="0"/>
+              <a:rPr lang="en-US"/>
               <a:t>Laboratory for Percutaneous Surgery (The Perk Lab) – Copyright © Queen’s University, 2011</a:t>
             </a:r>
           </a:p>
@@ -6584,7 +6342,7 @@
                 <a:defRPr/>
               </a:pPr>
               <a:r>
-                <a:rPr kumimoji="0" lang="en-US" sz="2400" b="0" i="0" u="none" strike="noStrike" kern="1200" cap="none" spc="0" normalizeH="0" baseline="0" noProof="0" dirty="0" smtClean="0">
+                <a:rPr kumimoji="0" lang="en-US" sz="2400" b="0" i="0" u="none" strike="noStrike" kern="1200" cap="none" spc="0" normalizeH="0" baseline="0" noProof="0" dirty="0">
                   <a:ln>
                     <a:noFill/>
                   </a:ln>
@@ -6689,14 +6447,14 @@
               <a:defRPr/>
             </a:pPr>
             <a:r>
-              <a:rPr lang="en-US" sz="1600" dirty="0" smtClean="0">
+              <a:rPr lang="en-US" sz="1600" dirty="0">
                 <a:solidFill>
                   <a:srgbClr val="FF0000"/>
                 </a:solidFill>
               </a:rPr>
               <a:t>←</a:t>
             </a:r>
-            <a:endParaRPr kumimoji="0" lang="en-US" sz="1600" b="0" i="0" u="none" strike="noStrike" kern="1200" cap="none" spc="0" normalizeH="0" baseline="0" noProof="0" dirty="0" smtClean="0">
+            <a:endParaRPr kumimoji="0" lang="en-US" sz="1600" b="0" i="0" u="none" strike="noStrike" kern="1200" cap="none" spc="0" normalizeH="0" baseline="0" noProof="0" dirty="0">
               <a:ln>
                 <a:noFill/>
               </a:ln>
@@ -6752,14 +6510,14 @@
               <a:defRPr/>
             </a:pPr>
             <a:r>
-              <a:rPr lang="en-US" sz="1500" dirty="0" smtClean="0">
+              <a:rPr lang="en-US" sz="1500" dirty="0">
                 <a:solidFill>
                   <a:srgbClr val="FFC000"/>
                 </a:solidFill>
               </a:rPr>
               <a:t>→</a:t>
             </a:r>
-            <a:endParaRPr kumimoji="0" lang="en-US" sz="1500" b="0" i="0" u="none" strike="noStrike" kern="1200" cap="none" spc="0" normalizeH="0" baseline="0" noProof="0" dirty="0" smtClean="0">
+            <a:endParaRPr kumimoji="0" lang="en-US" sz="1500" b="0" i="0" u="none" strike="noStrike" kern="1200" cap="none" spc="0" normalizeH="0" baseline="0" noProof="0" dirty="0">
               <a:ln>
                 <a:noFill/>
               </a:ln>
@@ -6815,14 +6573,14 @@
               <a:defRPr/>
             </a:pPr>
             <a:r>
-              <a:rPr lang="en-US" sz="1600" dirty="0" smtClean="0">
+              <a:rPr lang="en-US" sz="1600" dirty="0">
                 <a:solidFill>
                   <a:srgbClr val="FF0000"/>
                 </a:solidFill>
               </a:rPr>
               <a:t>←</a:t>
             </a:r>
-            <a:endParaRPr kumimoji="0" lang="en-US" sz="1600" b="0" i="0" u="none" strike="noStrike" kern="1200" cap="none" spc="0" normalizeH="0" baseline="0" noProof="0" dirty="0" smtClean="0">
+            <a:endParaRPr kumimoji="0" lang="en-US" sz="1600" b="0" i="0" u="none" strike="noStrike" kern="1200" cap="none" spc="0" normalizeH="0" baseline="0" noProof="0" dirty="0">
               <a:ln>
                 <a:noFill/>
               </a:ln>
@@ -6878,14 +6636,14 @@
               <a:defRPr/>
             </a:pPr>
             <a:r>
-              <a:rPr lang="en-US" sz="1500" dirty="0" smtClean="0">
+              <a:rPr lang="en-US" sz="1500" dirty="0">
                 <a:solidFill>
                   <a:srgbClr val="FFC000"/>
                 </a:solidFill>
               </a:rPr>
               <a:t>→</a:t>
             </a:r>
-            <a:endParaRPr kumimoji="0" lang="en-US" sz="1500" b="0" i="0" u="none" strike="noStrike" kern="1200" cap="none" spc="0" normalizeH="0" baseline="0" noProof="0" dirty="0" smtClean="0">
+            <a:endParaRPr kumimoji="0" lang="en-US" sz="1500" b="0" i="0" u="none" strike="noStrike" kern="1200" cap="none" spc="0" normalizeH="0" baseline="0" noProof="0" dirty="0">
               <a:ln>
                 <a:noFill/>
               </a:ln>
@@ -6941,14 +6699,14 @@
               <a:defRPr/>
             </a:pPr>
             <a:r>
-              <a:rPr lang="en-US" sz="1600" dirty="0" smtClean="0">
+              <a:rPr lang="en-US" sz="1600" dirty="0">
                 <a:solidFill>
                   <a:srgbClr val="FF0000"/>
                 </a:solidFill>
               </a:rPr>
               <a:t>←</a:t>
             </a:r>
-            <a:endParaRPr kumimoji="0" lang="en-US" sz="1600" b="0" i="0" u="none" strike="noStrike" kern="1200" cap="none" spc="0" normalizeH="0" baseline="0" noProof="0" dirty="0" smtClean="0">
+            <a:endParaRPr kumimoji="0" lang="en-US" sz="1600" b="0" i="0" u="none" strike="noStrike" kern="1200" cap="none" spc="0" normalizeH="0" baseline="0" noProof="0" dirty="0">
               <a:ln>
                 <a:noFill/>
               </a:ln>
@@ -7004,14 +6762,14 @@
               <a:defRPr/>
             </a:pPr>
             <a:r>
-              <a:rPr lang="en-US" sz="1600" dirty="0" smtClean="0">
+              <a:rPr lang="en-US" sz="1600" dirty="0">
                 <a:solidFill>
                   <a:srgbClr val="FF0000"/>
                 </a:solidFill>
               </a:rPr>
               <a:t>←</a:t>
             </a:r>
-            <a:endParaRPr kumimoji="0" lang="en-US" sz="1600" b="0" i="0" u="none" strike="noStrike" kern="1200" cap="none" spc="0" normalizeH="0" baseline="0" noProof="0" dirty="0" smtClean="0">
+            <a:endParaRPr kumimoji="0" lang="en-US" sz="1600" b="0" i="0" u="none" strike="noStrike" kern="1200" cap="none" spc="0" normalizeH="0" baseline="0" noProof="0" dirty="0">
               <a:ln>
                 <a:noFill/>
               </a:ln>
@@ -7067,14 +6825,14 @@
               <a:defRPr/>
             </a:pPr>
             <a:r>
-              <a:rPr lang="en-US" sz="1600" dirty="0" smtClean="0">
+              <a:rPr lang="en-US" sz="1600" dirty="0">
                 <a:solidFill>
                   <a:srgbClr val="FFC000"/>
                 </a:solidFill>
               </a:rPr>
               <a:t>←</a:t>
             </a:r>
-            <a:endParaRPr kumimoji="0" lang="en-US" sz="1600" b="0" i="0" u="none" strike="noStrike" kern="1200" cap="none" spc="0" normalizeH="0" baseline="0" noProof="0" dirty="0" smtClean="0">
+            <a:endParaRPr kumimoji="0" lang="en-US" sz="1600" b="0" i="0" u="none" strike="noStrike" kern="1200" cap="none" spc="0" normalizeH="0" baseline="0" noProof="0" dirty="0">
               <a:ln>
                 <a:noFill/>
               </a:ln>
@@ -7130,14 +6888,14 @@
               <a:defRPr/>
             </a:pPr>
             <a:r>
-              <a:rPr lang="en-US" sz="1600" dirty="0" smtClean="0">
+              <a:rPr lang="en-US" sz="1600" dirty="0">
                 <a:solidFill>
                   <a:srgbClr val="FFC000"/>
                 </a:solidFill>
               </a:rPr>
               <a:t>←</a:t>
             </a:r>
-            <a:endParaRPr kumimoji="0" lang="en-US" sz="1600" b="0" i="0" u="none" strike="noStrike" kern="1200" cap="none" spc="0" normalizeH="0" baseline="0" noProof="0" dirty="0" smtClean="0">
+            <a:endParaRPr kumimoji="0" lang="en-US" sz="1600" b="0" i="0" u="none" strike="noStrike" kern="1200" cap="none" spc="0" normalizeH="0" baseline="0" noProof="0" dirty="0">
               <a:ln>
                 <a:noFill/>
               </a:ln>
@@ -7193,14 +6951,14 @@
               <a:defRPr/>
             </a:pPr>
             <a:r>
-              <a:rPr lang="en-US" sz="1600" dirty="0" smtClean="0">
+              <a:rPr lang="en-US" sz="1600" dirty="0">
                 <a:solidFill>
                   <a:srgbClr val="FF0000"/>
                 </a:solidFill>
               </a:rPr>
               <a:t>←</a:t>
             </a:r>
-            <a:endParaRPr kumimoji="0" lang="en-US" sz="1600" b="0" i="0" u="none" strike="noStrike" kern="1200" cap="none" spc="0" normalizeH="0" baseline="0" noProof="0" dirty="0" smtClean="0">
+            <a:endParaRPr kumimoji="0" lang="en-US" sz="1600" b="0" i="0" u="none" strike="noStrike" kern="1200" cap="none" spc="0" normalizeH="0" baseline="0" noProof="0" dirty="0">
               <a:ln>
                 <a:noFill/>
               </a:ln>
@@ -7256,14 +7014,14 @@
               <a:defRPr/>
             </a:pPr>
             <a:r>
-              <a:rPr lang="en-US" sz="1600" dirty="0" smtClean="0">
+              <a:rPr lang="en-US" sz="1600" dirty="0">
                 <a:solidFill>
                   <a:srgbClr val="FF0000"/>
                 </a:solidFill>
               </a:rPr>
               <a:t>←</a:t>
             </a:r>
-            <a:endParaRPr kumimoji="0" lang="en-US" sz="1600" b="0" i="0" u="none" strike="noStrike" kern="1200" cap="none" spc="0" normalizeH="0" baseline="0" noProof="0" dirty="0" smtClean="0">
+            <a:endParaRPr kumimoji="0" lang="en-US" sz="1600" b="0" i="0" u="none" strike="noStrike" kern="1200" cap="none" spc="0" normalizeH="0" baseline="0" noProof="0" dirty="0">
               <a:ln>
                 <a:noFill/>
               </a:ln>
@@ -7319,14 +7077,14 @@
               <a:defRPr/>
             </a:pPr>
             <a:r>
-              <a:rPr lang="en-US" sz="1600" dirty="0" smtClean="0">
+              <a:rPr lang="en-US" sz="1600" dirty="0">
                 <a:solidFill>
                   <a:srgbClr val="FF0000"/>
                 </a:solidFill>
               </a:rPr>
               <a:t>←</a:t>
             </a:r>
-            <a:endParaRPr kumimoji="0" lang="en-US" sz="1600" b="0" i="0" u="none" strike="noStrike" kern="1200" cap="none" spc="0" normalizeH="0" baseline="0" noProof="0" dirty="0" smtClean="0">
+            <a:endParaRPr kumimoji="0" lang="en-US" sz="1600" b="0" i="0" u="none" strike="noStrike" kern="1200" cap="none" spc="0" normalizeH="0" baseline="0" noProof="0" dirty="0">
               <a:ln>
                 <a:noFill/>
               </a:ln>
@@ -7382,14 +7140,14 @@
               <a:defRPr/>
             </a:pPr>
             <a:r>
-              <a:rPr lang="en-US" sz="1600" dirty="0" smtClean="0">
+              <a:rPr lang="en-US" sz="1600" dirty="0">
                 <a:solidFill>
                   <a:srgbClr val="FF0000"/>
                 </a:solidFill>
               </a:rPr>
               <a:t>←</a:t>
             </a:r>
-            <a:endParaRPr kumimoji="0" lang="en-US" sz="1600" b="0" i="0" u="none" strike="noStrike" kern="1200" cap="none" spc="0" normalizeH="0" baseline="0" noProof="0" dirty="0" smtClean="0">
+            <a:endParaRPr kumimoji="0" lang="en-US" sz="1600" b="0" i="0" u="none" strike="noStrike" kern="1200" cap="none" spc="0" normalizeH="0" baseline="0" noProof="0" dirty="0">
               <a:ln>
                 <a:noFill/>
               </a:ln>
@@ -7445,14 +7203,14 @@
               <a:defRPr/>
             </a:pPr>
             <a:r>
-              <a:rPr lang="en-US" sz="1600" noProof="0" dirty="0" smtClean="0">
+              <a:rPr lang="en-US" sz="1600" noProof="0" dirty="0">
                 <a:solidFill>
                   <a:srgbClr val="FF0000"/>
                 </a:solidFill>
               </a:rPr>
               <a:t>Align to the left</a:t>
             </a:r>
-            <a:endParaRPr kumimoji="0" lang="en-US" sz="1600" b="0" i="0" u="none" strike="noStrike" kern="1200" cap="none" spc="0" normalizeH="0" baseline="0" noProof="0" dirty="0" smtClean="0">
+            <a:endParaRPr kumimoji="0" lang="en-US" sz="1600" b="0" i="0" u="none" strike="noStrike" kern="1200" cap="none" spc="0" normalizeH="0" baseline="0" noProof="0" dirty="0">
               <a:ln>
                 <a:noFill/>
               </a:ln>
@@ -7479,13 +7237,6 @@
   <p:clrMapOvr>
     <a:masterClrMapping/>
   </p:clrMapOvr>
-  <p:timing>
-    <p:tnLst>
-      <p:par>
-        <p:cTn id="1" dur="indefinite" restart="never" nodeType="tmRoot"/>
-      </p:par>
-    </p:tnLst>
-  </p:timing>
 </p:sld>
 </file>
 
@@ -7524,10 +7275,9 @@
           <a:lstStyle/>
           <a:p>
             <a:r>
-              <a:rPr lang="en-CA" dirty="0" smtClean="0"/>
+              <a:rPr lang="en-CA" dirty="0"/>
               <a:t>Example</a:t>
             </a:r>
-            <a:endParaRPr lang="en-CA" dirty="0"/>
           </a:p>
         </p:txBody>
       </p:sp>
@@ -7557,7 +7307,7 @@
               <a:buNone/>
             </a:pPr>
             <a:r>
-              <a:rPr lang="en-CA" dirty="0" smtClean="0"/>
+              <a:rPr lang="en-CA" dirty="0"/>
               <a:t>Phantom model: fCal_1.0, Wiring: wiring_1.0</a:t>
             </a:r>
           </a:p>
@@ -7579,7 +7329,7 @@
           <a:lstStyle/>
           <a:p>
             <a:r>
-              <a:rPr lang="en-US" smtClean="0"/>
+              <a:rPr lang="en-US"/>
               <a:t>Laboratory for Percutaneous Surgery (The Perk Lab) – Copyright © Queen’s University, 2011</a:t>
             </a:r>
           </a:p>
@@ -7653,7 +7403,7 @@
               <a:defRPr/>
             </a:pPr>
             <a:r>
-              <a:rPr kumimoji="0" lang="en-US" sz="2400" b="0" i="0" u="none" strike="noStrike" kern="1200" cap="none" spc="0" normalizeH="0" baseline="0" noProof="0" dirty="0" smtClean="0">
+              <a:rPr kumimoji="0" lang="en-US" sz="2400" b="0" i="0" u="none" strike="noStrike" kern="1200" cap="none" spc="0" normalizeH="0" baseline="0" noProof="0" dirty="0">
                 <a:ln>
                   <a:noFill/>
                 </a:ln>
@@ -7783,7 +7533,7 @@
               <a:defRPr/>
             </a:pPr>
             <a:r>
-              <a:rPr kumimoji="0" lang="en-US" sz="2400" b="0" i="0" u="none" strike="noStrike" kern="1200" cap="none" spc="0" normalizeH="0" baseline="0" noProof="0" dirty="0" smtClean="0">
+              <a:rPr kumimoji="0" lang="en-US" sz="2400" b="0" i="0" u="none" strike="noStrike" kern="1200" cap="none" spc="0" normalizeH="0" baseline="0" noProof="0" dirty="0">
                 <a:ln>
                   <a:noFill/>
                 </a:ln>
@@ -7877,7 +7627,7 @@
               <a:defRPr/>
             </a:pPr>
             <a:r>
-              <a:rPr lang="en-US" sz="2400" dirty="0" smtClean="0">
+              <a:rPr lang="en-US" sz="2400" dirty="0">
                 <a:solidFill>
                   <a:srgbClr val="FF0000"/>
                 </a:solidFill>
@@ -7885,7 +7635,7 @@
               <a:t>F</a:t>
             </a:r>
             <a:r>
-              <a:rPr kumimoji="0" lang="en-US" sz="2400" b="0" i="0" u="none" strike="noStrike" kern="1200" cap="none" spc="0" normalizeH="0" baseline="0" noProof="0" dirty="0" smtClean="0">
+              <a:rPr kumimoji="0" lang="en-US" sz="2400" b="0" i="0" u="none" strike="noStrike" kern="1200" cap="none" spc="0" normalizeH="0" baseline="0" noProof="0" dirty="0">
                 <a:ln>
                   <a:noFill/>
                 </a:ln>
@@ -7979,7 +7729,7 @@
               <a:defRPr/>
             </a:pPr>
             <a:r>
-              <a:rPr lang="en-US" sz="2400" noProof="0" dirty="0" smtClean="0">
+              <a:rPr lang="en-US" sz="2400" noProof="0" dirty="0">
                 <a:solidFill>
                   <a:srgbClr val="FF0000"/>
                 </a:solidFill>
@@ -7987,7 +7737,7 @@
               <a:t>j</a:t>
             </a:r>
             <a:r>
-              <a:rPr kumimoji="0" lang="en-US" sz="2400" b="0" i="0" u="none" strike="noStrike" kern="1200" cap="none" spc="0" normalizeH="0" baseline="0" noProof="0" dirty="0" smtClean="0">
+              <a:rPr kumimoji="0" lang="en-US" sz="2400" b="0" i="0" u="none" strike="noStrike" kern="1200" cap="none" spc="0" normalizeH="0" baseline="0" noProof="0" dirty="0">
                 <a:ln>
                   <a:noFill/>
                 </a:ln>
@@ -8045,7 +7795,7 @@
               <a:defRPr/>
             </a:pPr>
             <a:r>
-              <a:rPr lang="en-US" sz="2400" dirty="0" smtClean="0">
+              <a:rPr lang="en-US" sz="2400" dirty="0">
                 <a:solidFill>
                   <a:srgbClr val="FF0000"/>
                 </a:solidFill>
@@ -8053,7 +7803,7 @@
               <a:t>K</a:t>
             </a:r>
             <a:r>
-              <a:rPr kumimoji="0" lang="en-US" sz="2400" b="0" i="0" u="none" strike="noStrike" kern="1200" cap="none" spc="0" normalizeH="0" baseline="0" noProof="0" dirty="0" smtClean="0">
+              <a:rPr kumimoji="0" lang="en-US" sz="2400" b="0" i="0" u="none" strike="noStrike" kern="1200" cap="none" spc="0" normalizeH="0" baseline="0" noProof="0" dirty="0">
                 <a:ln>
                   <a:noFill/>
                 </a:ln>
@@ -8147,7 +7897,7 @@
               <a:defRPr/>
             </a:pPr>
             <a:r>
-              <a:rPr lang="en-US" sz="2400" noProof="0" dirty="0" smtClean="0">
+              <a:rPr lang="en-US" sz="2400" noProof="0" dirty="0">
                 <a:solidFill>
                   <a:srgbClr val="FF0000"/>
                 </a:solidFill>
@@ -8155,7 +7905,7 @@
               <a:t>k</a:t>
             </a:r>
             <a:r>
-              <a:rPr kumimoji="0" lang="en-US" sz="2400" b="0" i="0" u="none" strike="noStrike" kern="1200" cap="none" spc="0" normalizeH="0" baseline="0" noProof="0" dirty="0" smtClean="0">
+              <a:rPr kumimoji="0" lang="en-US" sz="2400" b="0" i="0" u="none" strike="noStrike" kern="1200" cap="none" spc="0" normalizeH="0" baseline="0" noProof="0" dirty="0">
                 <a:ln>
                   <a:noFill/>
                 </a:ln>
@@ -8249,7 +7999,7 @@
               <a:defRPr/>
             </a:pPr>
             <a:r>
-              <a:rPr kumimoji="0" lang="en-US" sz="2400" b="0" i="0" u="none" strike="noStrike" kern="1200" cap="none" spc="0" normalizeH="0" baseline="0" noProof="0" dirty="0" smtClean="0">
+              <a:rPr kumimoji="0" lang="en-US" sz="2400" b="0" i="0" u="none" strike="noStrike" kern="1200" cap="none" spc="0" normalizeH="0" baseline="0" noProof="0" dirty="0">
                 <a:ln>
                   <a:noFill/>
                 </a:ln>
@@ -8343,7 +8093,7 @@
               <a:defRPr/>
             </a:pPr>
             <a:r>
-              <a:rPr kumimoji="0" lang="en-US" sz="2400" b="0" i="0" u="none" strike="noStrike" kern="1200" cap="none" spc="0" normalizeH="0" baseline="0" noProof="0" dirty="0" smtClean="0">
+              <a:rPr kumimoji="0" lang="en-US" sz="2400" b="0" i="0" u="none" strike="noStrike" kern="1200" cap="none" spc="0" normalizeH="0" baseline="0" noProof="0" dirty="0">
                 <a:ln>
                   <a:noFill/>
                 </a:ln>
@@ -8475,7 +8225,7 @@
               <a:defRPr/>
             </a:pPr>
             <a:r>
-              <a:rPr lang="en-US" sz="2400" dirty="0" smtClean="0">
+              <a:rPr lang="en-US" sz="2400" dirty="0">
                 <a:solidFill>
                   <a:srgbClr val="FF0000"/>
                 </a:solidFill>
@@ -8483,7 +8233,7 @@
               <a:t>J</a:t>
             </a:r>
             <a:r>
-              <a:rPr kumimoji="0" lang="en-US" sz="2400" b="0" i="0" u="none" strike="noStrike" kern="1200" cap="none" spc="0" normalizeH="0" baseline="0" noProof="0" dirty="0" smtClean="0">
+              <a:rPr kumimoji="0" lang="en-US" sz="2400" b="0" i="0" u="none" strike="noStrike" kern="1200" cap="none" spc="0" normalizeH="0" baseline="0" noProof="0" dirty="0">
                 <a:ln>
                   <a:noFill/>
                 </a:ln>
@@ -8541,7 +8291,7 @@
               <a:defRPr/>
             </a:pPr>
             <a:r>
-              <a:rPr kumimoji="0" lang="en-US" sz="2400" b="0" i="0" u="none" strike="noStrike" kern="1200" cap="none" spc="0" normalizeH="0" baseline="0" noProof="0" dirty="0" smtClean="0">
+              <a:rPr kumimoji="0" lang="en-US" sz="2400" b="0" i="0" u="none" strike="noStrike" kern="1200" cap="none" spc="0" normalizeH="0" baseline="0" noProof="0" dirty="0">
                 <a:ln>
                   <a:noFill/>
                 </a:ln>
@@ -8635,7 +8385,7 @@
               <a:defRPr/>
             </a:pPr>
             <a:r>
-              <a:rPr kumimoji="0" lang="en-US" sz="2400" b="0" i="0" u="none" strike="noStrike" kern="1200" cap="none" spc="0" normalizeH="0" baseline="0" noProof="0" dirty="0" smtClean="0">
+              <a:rPr kumimoji="0" lang="en-US" sz="2400" b="0" i="0" u="none" strike="noStrike" kern="1200" cap="none" spc="0" normalizeH="0" baseline="0" noProof="0" dirty="0">
                 <a:ln>
                   <a:noFill/>
                 </a:ln>
@@ -8729,7 +8479,7 @@
               <a:defRPr/>
             </a:pPr>
             <a:r>
-              <a:rPr kumimoji="0" lang="en-US" sz="2400" b="0" i="0" u="none" strike="noStrike" kern="1200" cap="none" spc="0" normalizeH="0" baseline="0" noProof="0" dirty="0" smtClean="0">
+              <a:rPr kumimoji="0" lang="en-US" sz="2400" b="0" i="0" u="none" strike="noStrike" kern="1200" cap="none" spc="0" normalizeH="0" baseline="0" noProof="0" dirty="0">
                 <a:ln>
                   <a:noFill/>
                 </a:ln>
@@ -8823,7 +8573,7 @@
               <a:defRPr/>
             </a:pPr>
             <a:r>
-              <a:rPr kumimoji="0" lang="en-US" sz="2400" b="0" i="0" u="none" strike="noStrike" kern="1200" cap="none" spc="0" normalizeH="0" baseline="0" noProof="0" dirty="0" smtClean="0">
+              <a:rPr kumimoji="0" lang="en-US" sz="2400" b="0" i="0" u="none" strike="noStrike" kern="1200" cap="none" spc="0" normalizeH="0" baseline="0" noProof="0" dirty="0">
                 <a:ln>
                   <a:noFill/>
                 </a:ln>
@@ -8849,13 +8599,6 @@
   <p:clrMapOvr>
     <a:masterClrMapping/>
   </p:clrMapOvr>
-  <p:timing>
-    <p:tnLst>
-      <p:par>
-        <p:cTn id="1" dur="indefinite" restart="never" nodeType="tmRoot"/>
-      </p:par>
-    </p:tnLst>
-  </p:timing>
 </p:sld>
 </file>
 

</xml_diff>